<commit_message>
Setup a little presentation for the 13th
</commit_message>
<xml_diff>
--- a/Allergeeks/Corporate Design/Bsp Präsi.pptx
+++ b/Allergeeks/Corporate Design/Bsp Präsi.pptx
@@ -7,11 +7,16 @@
   <p:sldIdLst>
     <p:sldId id="256" r:id="rId2"/>
     <p:sldId id="257" r:id="rId3"/>
-    <p:sldId id="258" r:id="rId4"/>
-    <p:sldId id="259" r:id="rId5"/>
-    <p:sldId id="260" r:id="rId6"/>
-    <p:sldId id="261" r:id="rId7"/>
-    <p:sldId id="262" r:id="rId8"/>
+    <p:sldId id="262" r:id="rId4"/>
+    <p:sldId id="263" r:id="rId5"/>
+    <p:sldId id="264" r:id="rId6"/>
+    <p:sldId id="265" r:id="rId7"/>
+    <p:sldId id="266" r:id="rId8"/>
+    <p:sldId id="267" r:id="rId9"/>
+    <p:sldId id="268" r:id="rId10"/>
+    <p:sldId id="269" r:id="rId11"/>
+    <p:sldId id="270" r:id="rId12"/>
+    <p:sldId id="271" r:id="rId13"/>
   </p:sldIdLst>
   <p:sldSz cx="12192000" cy="6858000"/>
   <p:notesSz cx="6858000" cy="9144000"/>
@@ -112,7 +117,7 @@
   </p:defaultTextStyle>
   <p:extLst>
     <p:ext uri="{EFAFB233-063F-42B5-8137-9DF3F51BA10A}">
-      <p15:sldGuideLst xmlns:p15="http://schemas.microsoft.com/office/powerpoint/2012/main"/>
+      <p15:sldGuideLst xmlns:p15="http://schemas.microsoft.com/office/powerpoint/2012/main" xmlns=""/>
     </p:ext>
   </p:extLst>
 </p:presentation>
@@ -262,7 +267,7 @@
             <a:fld id="{B61BEF0D-F0BB-DE4B-95CE-6DB70DBA9567}" type="datetimeFigureOut">
               <a:rPr lang="en-US" smtClean="0"/>
               <a:pPr/>
-              <a:t>2/23/2015</a:t>
+              <a:t>4/12/2015</a:t>
             </a:fld>
             <a:endParaRPr lang="en-US" dirty="0"/>
           </a:p>
@@ -494,7 +499,7 @@
           <a:p>
             <a:fld id="{55C6B4A9-1611-4792-9094-5F34BCA07E0B}" type="datetimeFigureOut">
               <a:rPr lang="en-US" smtClean="0"/>
-              <a:t>2/23/2015</a:t>
+              <a:t>4/12/2015</a:t>
             </a:fld>
             <a:endParaRPr lang="en-US" dirty="0"/>
           </a:p>
@@ -699,7 +704,7 @@
             <a:fld id="{B61BEF0D-F0BB-DE4B-95CE-6DB70DBA9567}" type="datetimeFigureOut">
               <a:rPr lang="en-US" smtClean="0"/>
               <a:pPr/>
-              <a:t>2/23/2015</a:t>
+              <a:t>4/12/2015</a:t>
             </a:fld>
             <a:endParaRPr lang="en-US" dirty="0"/>
           </a:p>
@@ -899,7 +904,7 @@
             <a:fld id="{B61BEF0D-F0BB-DE4B-95CE-6DB70DBA9567}" type="datetimeFigureOut">
               <a:rPr lang="en-US" smtClean="0"/>
               <a:pPr/>
-              <a:t>2/23/2015</a:t>
+              <a:t>4/12/2015</a:t>
             </a:fld>
             <a:endParaRPr lang="en-US" dirty="0"/>
           </a:p>
@@ -1171,7 +1176,7 @@
             <a:fld id="{B61BEF0D-F0BB-DE4B-95CE-6DB70DBA9567}" type="datetimeFigureOut">
               <a:rPr lang="en-US" smtClean="0"/>
               <a:pPr/>
-              <a:t>2/23/2015</a:t>
+              <a:t>4/12/2015</a:t>
             </a:fld>
             <a:endParaRPr lang="en-US" dirty="0"/>
           </a:p>
@@ -1428,7 +1433,7 @@
           <a:p>
             <a:fld id="{EB712588-04B1-427B-82EE-E8DB90309F08}" type="datetimeFigureOut">
               <a:rPr lang="en-US" smtClean="0"/>
-              <a:t>2/23/2015</a:t>
+              <a:t>4/12/2015</a:t>
             </a:fld>
             <a:endParaRPr lang="en-US" dirty="0"/>
           </a:p>
@@ -1820,7 +1825,7 @@
             <a:fld id="{B61BEF0D-F0BB-DE4B-95CE-6DB70DBA9567}" type="datetimeFigureOut">
               <a:rPr lang="en-US" smtClean="0"/>
               <a:pPr/>
-              <a:t>2/23/2015</a:t>
+              <a:t>4/12/2015</a:t>
             </a:fld>
             <a:endParaRPr lang="en-US" dirty="0"/>
           </a:p>
@@ -1964,7 +1969,7 @@
             <a:fld id="{B61BEF0D-F0BB-DE4B-95CE-6DB70DBA9567}" type="datetimeFigureOut">
               <a:rPr lang="en-US" smtClean="0"/>
               <a:pPr/>
-              <a:t>2/23/2015</a:t>
+              <a:t>4/12/2015</a:t>
             </a:fld>
             <a:endParaRPr lang="en-US" dirty="0"/>
           </a:p>
@@ -2085,7 +2090,7 @@
             <a:fld id="{B61BEF0D-F0BB-DE4B-95CE-6DB70DBA9567}" type="datetimeFigureOut">
               <a:rPr lang="en-US" smtClean="0"/>
               <a:pPr/>
-              <a:t>2/23/2015</a:t>
+              <a:t>4/12/2015</a:t>
             </a:fld>
             <a:endParaRPr lang="en-US" dirty="0"/>
           </a:p>
@@ -2387,7 +2392,7 @@
           <a:p>
             <a:fld id="{42A54C80-263E-416B-A8E0-580EDEADCBDC}" type="datetimeFigureOut">
               <a:rPr lang="en-US" smtClean="0"/>
-              <a:t>2/23/2015</a:t>
+              <a:t>4/12/2015</a:t>
             </a:fld>
             <a:endParaRPr lang="en-US" dirty="0"/>
           </a:p>
@@ -2665,7 +2670,7 @@
             <a:fld id="{B61BEF0D-F0BB-DE4B-95CE-6DB70DBA9567}" type="datetimeFigureOut">
               <a:rPr lang="en-US" smtClean="0"/>
               <a:pPr/>
-              <a:t>2/23/2015</a:t>
+              <a:t>4/12/2015</a:t>
             </a:fld>
             <a:endParaRPr lang="en-US" dirty="0"/>
           </a:p>
@@ -2886,7 +2891,7 @@
             <a:fld id="{B61BEF0D-F0BB-DE4B-95CE-6DB70DBA9567}" type="datetimeFigureOut">
               <a:rPr lang="en-US" smtClean="0"/>
               <a:pPr/>
-              <a:t>2/23/2015</a:t>
+              <a:t>4/12/2015</a:t>
             </a:fld>
             <a:endParaRPr lang="en-US" dirty="0"/>
           </a:p>
@@ -3353,9 +3358,8 @@
           <a:p>
             <a:r>
               <a:rPr lang="de-DE" b="1" dirty="0" smtClean="0"/>
-              <a:t>Projektvorstellung</a:t>
-            </a:r>
-            <a:endParaRPr lang="de-DE" b="1" dirty="0"/>
+              <a:t>Software Architektur</a:t>
+            </a:r>
           </a:p>
         </p:txBody>
       </p:sp>
@@ -3363,6 +3367,285 @@
     <p:extLst>
       <p:ext uri="{BB962C8B-B14F-4D97-AF65-F5344CB8AC3E}">
         <p14:creationId xmlns:p14="http://schemas.microsoft.com/office/powerpoint/2010/main" val="1908629091"/>
+      </p:ext>
+    </p:extLst>
+  </p:cSld>
+  <p:clrMapOvr>
+    <a:masterClrMapping/>
+  </p:clrMapOvr>
+  <p:timing>
+    <p:tnLst>
+      <p:par>
+        <p:cTn id="1" dur="indefinite" restart="never" nodeType="tmRoot"/>
+      </p:par>
+    </p:tnLst>
+  </p:timing>
+</p:sld>
+</file>
+
+<file path=ppt/slides/slide10.xml><?xml version="1.0" encoding="utf-8"?>
+<p:sld xmlns:a="http://schemas.openxmlformats.org/drawingml/2006/main" xmlns:r="http://schemas.openxmlformats.org/officeDocument/2006/relationships" xmlns:p="http://schemas.openxmlformats.org/presentationml/2006/main">
+  <p:cSld>
+    <p:spTree>
+      <p:nvGrpSpPr>
+        <p:cNvPr id="1" name=""/>
+        <p:cNvGrpSpPr/>
+        <p:nvPr/>
+      </p:nvGrpSpPr>
+      <p:grpSpPr>
+        <a:xfrm>
+          <a:off x="0" y="0"/>
+          <a:ext cx="0" cy="0"/>
+          <a:chOff x="0" y="0"/>
+          <a:chExt cx="0" cy="0"/>
+        </a:xfrm>
+      </p:grpSpPr>
+      <p:sp>
+        <p:nvSpPr>
+          <p:cNvPr id="2" name="Titel 1"/>
+          <p:cNvSpPr>
+            <a:spLocks noGrp="1"/>
+          </p:cNvSpPr>
+          <p:nvPr>
+            <p:ph type="title"/>
+          </p:nvPr>
+        </p:nvSpPr>
+        <p:spPr/>
+        <p:txBody>
+          <a:bodyPr/>
+          <a:lstStyle/>
+          <a:p>
+            <a:r>
+              <a:rPr lang="de-DE" dirty="0" err="1" smtClean="0"/>
+              <a:t>Vuzix</a:t>
+            </a:r>
+            <a:r>
+              <a:rPr lang="de-DE" dirty="0" smtClean="0"/>
+              <a:t>-Klassendiagramm</a:t>
+            </a:r>
+            <a:endParaRPr lang="de-DE" dirty="0"/>
+          </a:p>
+        </p:txBody>
+      </p:sp>
+      <p:pic>
+        <p:nvPicPr>
+          <p:cNvPr id="4" name="Inhaltsplatzhalter 3"/>
+          <p:cNvPicPr>
+            <a:picLocks noGrp="1" noChangeAspect="1"/>
+          </p:cNvPicPr>
+          <p:nvPr>
+            <p:ph idx="1"/>
+          </p:nvPr>
+        </p:nvPicPr>
+        <p:blipFill>
+          <a:blip r:embed="rId2">
+            <a:extLst>
+              <a:ext uri="{28A0092B-C50C-407E-A947-70E740481C1C}">
+                <a14:useLocalDpi xmlns:a14="http://schemas.microsoft.com/office/drawing/2010/main" val="0"/>
+              </a:ext>
+            </a:extLst>
+          </a:blip>
+          <a:stretch>
+            <a:fillRect/>
+          </a:stretch>
+        </p:blipFill>
+        <p:spPr>
+          <a:xfrm>
+            <a:off x="2989856" y="1825625"/>
+            <a:ext cx="6212287" cy="4351338"/>
+          </a:xfrm>
+        </p:spPr>
+      </p:pic>
+    </p:spTree>
+    <p:extLst>
+      <p:ext uri="{BB962C8B-B14F-4D97-AF65-F5344CB8AC3E}">
+        <p14:creationId xmlns:p14="http://schemas.microsoft.com/office/powerpoint/2010/main" val="1943552789"/>
+      </p:ext>
+    </p:extLst>
+  </p:cSld>
+  <p:clrMapOvr>
+    <a:masterClrMapping/>
+  </p:clrMapOvr>
+  <p:timing>
+    <p:tnLst>
+      <p:par>
+        <p:cTn id="1" dur="indefinite" restart="never" nodeType="tmRoot"/>
+      </p:par>
+    </p:tnLst>
+  </p:timing>
+</p:sld>
+</file>
+
+<file path=ppt/slides/slide11.xml><?xml version="1.0" encoding="utf-8"?>
+<p:sld xmlns:a="http://schemas.openxmlformats.org/drawingml/2006/main" xmlns:r="http://schemas.openxmlformats.org/officeDocument/2006/relationships" xmlns:p="http://schemas.openxmlformats.org/presentationml/2006/main">
+  <p:cSld>
+    <p:spTree>
+      <p:nvGrpSpPr>
+        <p:cNvPr id="1" name=""/>
+        <p:cNvGrpSpPr/>
+        <p:nvPr/>
+      </p:nvGrpSpPr>
+      <p:grpSpPr>
+        <a:xfrm>
+          <a:off x="0" y="0"/>
+          <a:ext cx="0" cy="0"/>
+          <a:chOff x="0" y="0"/>
+          <a:chExt cx="0" cy="0"/>
+        </a:xfrm>
+      </p:grpSpPr>
+      <p:sp>
+        <p:nvSpPr>
+          <p:cNvPr id="2" name="Titel 1"/>
+          <p:cNvSpPr>
+            <a:spLocks noGrp="1"/>
+          </p:cNvSpPr>
+          <p:nvPr>
+            <p:ph type="title"/>
+          </p:nvPr>
+        </p:nvSpPr>
+        <p:spPr/>
+        <p:txBody>
+          <a:bodyPr/>
+          <a:lstStyle/>
+          <a:p>
+            <a:r>
+              <a:rPr lang="de-DE" dirty="0" smtClean="0"/>
+              <a:t>Smartphone-Klassendiagramm</a:t>
+            </a:r>
+            <a:endParaRPr lang="de-DE" dirty="0"/>
+          </a:p>
+        </p:txBody>
+      </p:sp>
+      <p:pic>
+        <p:nvPicPr>
+          <p:cNvPr id="5" name="Inhaltsplatzhalter 4"/>
+          <p:cNvPicPr>
+            <a:picLocks noGrp="1" noChangeAspect="1"/>
+          </p:cNvPicPr>
+          <p:nvPr>
+            <p:ph idx="1"/>
+          </p:nvPr>
+        </p:nvPicPr>
+        <p:blipFill>
+          <a:blip r:embed="rId2">
+            <a:extLst>
+              <a:ext uri="{28A0092B-C50C-407E-A947-70E740481C1C}">
+                <a14:useLocalDpi xmlns:a14="http://schemas.microsoft.com/office/drawing/2010/main" val="0"/>
+              </a:ext>
+            </a:extLst>
+          </a:blip>
+          <a:stretch>
+            <a:fillRect/>
+          </a:stretch>
+        </p:blipFill>
+        <p:spPr>
+          <a:xfrm>
+            <a:off x="1465730" y="1825625"/>
+            <a:ext cx="9260539" cy="4351338"/>
+          </a:xfrm>
+        </p:spPr>
+      </p:pic>
+    </p:spTree>
+    <p:extLst>
+      <p:ext uri="{BB962C8B-B14F-4D97-AF65-F5344CB8AC3E}">
+        <p14:creationId xmlns:p14="http://schemas.microsoft.com/office/powerpoint/2010/main" val="4092993981"/>
+      </p:ext>
+    </p:extLst>
+  </p:cSld>
+  <p:clrMapOvr>
+    <a:masterClrMapping/>
+  </p:clrMapOvr>
+  <p:timing>
+    <p:tnLst>
+      <p:par>
+        <p:cTn id="1" dur="indefinite" restart="never" nodeType="tmRoot"/>
+      </p:par>
+    </p:tnLst>
+  </p:timing>
+</p:sld>
+</file>
+
+<file path=ppt/slides/slide12.xml><?xml version="1.0" encoding="utf-8"?>
+<p:sld xmlns:a="http://schemas.openxmlformats.org/drawingml/2006/main" xmlns:r="http://schemas.openxmlformats.org/officeDocument/2006/relationships" xmlns:p="http://schemas.openxmlformats.org/presentationml/2006/main">
+  <p:cSld>
+    <p:spTree>
+      <p:nvGrpSpPr>
+        <p:cNvPr id="1" name=""/>
+        <p:cNvGrpSpPr/>
+        <p:nvPr/>
+      </p:nvGrpSpPr>
+      <p:grpSpPr>
+        <a:xfrm>
+          <a:off x="0" y="0"/>
+          <a:ext cx="0" cy="0"/>
+          <a:chOff x="0" y="0"/>
+          <a:chExt cx="0" cy="0"/>
+        </a:xfrm>
+      </p:grpSpPr>
+      <p:sp>
+        <p:nvSpPr>
+          <p:cNvPr id="2" name="Titel 1"/>
+          <p:cNvSpPr>
+            <a:spLocks noGrp="1"/>
+          </p:cNvSpPr>
+          <p:nvPr>
+            <p:ph type="title"/>
+          </p:nvPr>
+        </p:nvSpPr>
+        <p:spPr/>
+        <p:txBody>
+          <a:bodyPr/>
+          <a:lstStyle/>
+          <a:p>
+            <a:endParaRPr lang="de-DE" dirty="0"/>
+          </a:p>
+        </p:txBody>
+      </p:sp>
+      <p:sp>
+        <p:nvSpPr>
+          <p:cNvPr id="3" name="Inhaltsplatzhalter 2"/>
+          <p:cNvSpPr>
+            <a:spLocks noGrp="1"/>
+          </p:cNvSpPr>
+          <p:nvPr>
+            <p:ph idx="1"/>
+          </p:nvPr>
+        </p:nvSpPr>
+        <p:spPr/>
+        <p:txBody>
+          <a:bodyPr/>
+          <a:lstStyle/>
+          <a:p>
+            <a:endParaRPr lang="de-DE" dirty="0" smtClean="0"/>
+          </a:p>
+          <a:p>
+            <a:endParaRPr lang="de-DE" dirty="0"/>
+          </a:p>
+          <a:p>
+            <a:pPr algn="ctr"/>
+            <a:r>
+              <a:rPr lang="de-DE" b="1" dirty="0" smtClean="0"/>
+              <a:t>Ende</a:t>
+            </a:r>
+          </a:p>
+          <a:p>
+            <a:pPr algn="ctr"/>
+            <a:endParaRPr lang="de-DE" dirty="0" smtClean="0"/>
+          </a:p>
+          <a:p>
+            <a:pPr algn="ctr"/>
+            <a:r>
+              <a:rPr lang="de-DE" dirty="0" smtClean="0"/>
+              <a:t>Vielen Dank für Ihre Aufmerksamkeit</a:t>
+            </a:r>
+            <a:endParaRPr lang="de-DE" dirty="0"/>
+          </a:p>
+        </p:txBody>
+      </p:sp>
+    </p:spTree>
+    <p:extLst>
+      <p:ext uri="{BB962C8B-B14F-4D97-AF65-F5344CB8AC3E}">
+        <p14:creationId xmlns:p14="http://schemas.microsoft.com/office/powerpoint/2010/main" val="2673450312"/>
       </p:ext>
     </p:extLst>
   </p:cSld>
@@ -3431,46 +3714,87 @@
         </p:nvSpPr>
         <p:spPr/>
         <p:txBody>
-          <a:bodyPr/>
+          <a:bodyPr>
+            <a:normAutofit lnSpcReduction="10000"/>
+          </a:bodyPr>
           <a:lstStyle/>
           <a:p>
             <a:r>
               <a:rPr lang="de-DE" dirty="0" smtClean="0"/>
-              <a:t>Einleitung</a:t>
+              <a:t>Backend</a:t>
             </a:r>
           </a:p>
           <a:p>
             <a:pPr lvl="1"/>
             <a:r>
               <a:rPr lang="de-DE" dirty="0" smtClean="0"/>
-              <a:t>Projektidee</a:t>
+              <a:t>Klassendiagramm</a:t>
             </a:r>
           </a:p>
           <a:p>
             <a:pPr lvl="1"/>
             <a:r>
               <a:rPr lang="de-DE" dirty="0" smtClean="0"/>
-              <a:t>Team</a:t>
+              <a:t>Sequenzdiagramm</a:t>
             </a:r>
           </a:p>
           <a:p>
             <a:pPr lvl="1"/>
             <a:r>
               <a:rPr lang="de-DE" dirty="0" smtClean="0"/>
-              <a:t>Modell</a:t>
+              <a:t>Übersicht</a:t>
             </a:r>
           </a:p>
           <a:p>
             <a:r>
               <a:rPr lang="de-DE" dirty="0" smtClean="0"/>
-              <a:t>Projektrollen</a:t>
-            </a:r>
-          </a:p>
-          <a:p>
+              <a:t>Web-Frontend</a:t>
+            </a:r>
+          </a:p>
+          <a:p>
+            <a:pPr lvl="1"/>
             <a:r>
               <a:rPr lang="de-DE" dirty="0" smtClean="0"/>
-              <a:t>Meilensteine</a:t>
-            </a:r>
+              <a:t>Klassendiagramm</a:t>
+            </a:r>
+          </a:p>
+          <a:p>
+            <a:r>
+              <a:rPr lang="de-DE" dirty="0" err="1" smtClean="0"/>
+              <a:t>Vuzix</a:t>
+            </a:r>
+            <a:endParaRPr lang="de-DE" dirty="0" smtClean="0"/>
+          </a:p>
+          <a:p>
+            <a:pPr lvl="1"/>
+            <a:r>
+              <a:rPr lang="de-DE" dirty="0" smtClean="0"/>
+              <a:t>Klassendiagramm</a:t>
+            </a:r>
+          </a:p>
+          <a:p>
+            <a:r>
+              <a:rPr lang="de-DE" dirty="0" smtClean="0"/>
+              <a:t>Smartphone</a:t>
+            </a:r>
+          </a:p>
+          <a:p>
+            <a:pPr lvl="1"/>
+            <a:r>
+              <a:rPr lang="de-DE" dirty="0" smtClean="0"/>
+              <a:t>Klassendiagramm</a:t>
+            </a:r>
+          </a:p>
+          <a:p>
+            <a:pPr lvl="1"/>
+            <a:endParaRPr lang="de-DE" dirty="0" smtClean="0"/>
+          </a:p>
+          <a:p>
+            <a:pPr lvl="1"/>
+            <a:endParaRPr lang="de-DE" dirty="0" smtClean="0"/>
+          </a:p>
+          <a:p>
+            <a:endParaRPr lang="de-DE" dirty="0" smtClean="0"/>
           </a:p>
         </p:txBody>
       </p:sp>
@@ -3528,7 +3852,7 @@
           <a:p>
             <a:r>
               <a:rPr lang="de-DE" dirty="0" smtClean="0"/>
-              <a:t>Projektidee</a:t>
+              <a:t>Backend-Klassendiagramm</a:t>
             </a:r>
             <a:endParaRPr lang="de-DE" dirty="0"/>
           </a:p>
@@ -3558,303 +3882,15 @@
         </p:blipFill>
         <p:spPr>
           <a:xfrm>
-            <a:off x="2900180" y="3647972"/>
-            <a:ext cx="724001" cy="724001"/>
+            <a:off x="1321421" y="1825625"/>
+            <a:ext cx="9549158" cy="4351338"/>
           </a:xfrm>
         </p:spPr>
       </p:pic>
-      <p:pic>
-        <p:nvPicPr>
-          <p:cNvPr id="3" name="Grafik 2"/>
-          <p:cNvPicPr>
-            <a:picLocks noChangeAspect="1"/>
-          </p:cNvPicPr>
-          <p:nvPr/>
-        </p:nvPicPr>
-        <p:blipFill>
-          <a:blip r:embed="rId3">
-            <a:extLst>
-              <a:ext uri="{28A0092B-C50C-407E-A947-70E740481C1C}">
-                <a14:useLocalDpi xmlns:a14="http://schemas.microsoft.com/office/drawing/2010/main" val="0"/>
-              </a:ext>
-            </a:extLst>
-          </a:blip>
-          <a:stretch>
-            <a:fillRect/>
-          </a:stretch>
-        </p:blipFill>
-        <p:spPr>
-          <a:xfrm>
-            <a:off x="2900181" y="1988718"/>
-            <a:ext cx="724001" cy="724001"/>
-          </a:xfrm>
-          <a:prstGeom prst="rect">
-            <a:avLst/>
-          </a:prstGeom>
-        </p:spPr>
-      </p:pic>
-      <p:pic>
-        <p:nvPicPr>
-          <p:cNvPr id="4" name="Grafik 3"/>
-          <p:cNvPicPr>
-            <a:picLocks noChangeAspect="1"/>
-          </p:cNvPicPr>
-          <p:nvPr/>
-        </p:nvPicPr>
-        <p:blipFill>
-          <a:blip r:embed="rId4">
-            <a:extLst>
-              <a:ext uri="{28A0092B-C50C-407E-A947-70E740481C1C}">
-                <a14:useLocalDpi xmlns:a14="http://schemas.microsoft.com/office/drawing/2010/main" val="0"/>
-              </a:ext>
-            </a:extLst>
-          </a:blip>
-          <a:stretch>
-            <a:fillRect/>
-          </a:stretch>
-        </p:blipFill>
-        <p:spPr>
-          <a:xfrm>
-            <a:off x="2900180" y="2818345"/>
-            <a:ext cx="724001" cy="724001"/>
-          </a:xfrm>
-          <a:prstGeom prst="rect">
-            <a:avLst/>
-          </a:prstGeom>
-        </p:spPr>
-      </p:pic>
-      <p:pic>
-        <p:nvPicPr>
-          <p:cNvPr id="6" name="Grafik 5"/>
-          <p:cNvPicPr>
-            <a:picLocks noChangeAspect="1"/>
-          </p:cNvPicPr>
-          <p:nvPr/>
-        </p:nvPicPr>
-        <p:blipFill>
-          <a:blip r:embed="rId5">
-            <a:extLst>
-              <a:ext uri="{28A0092B-C50C-407E-A947-70E740481C1C}">
-                <a14:useLocalDpi xmlns:a14="http://schemas.microsoft.com/office/drawing/2010/main" val="0"/>
-              </a:ext>
-            </a:extLst>
-          </a:blip>
-          <a:stretch>
-            <a:fillRect/>
-          </a:stretch>
-        </p:blipFill>
-        <p:spPr>
-          <a:xfrm>
-            <a:off x="1632481" y="4477598"/>
-            <a:ext cx="724001" cy="724001"/>
-          </a:xfrm>
-          <a:prstGeom prst="rect">
-            <a:avLst/>
-          </a:prstGeom>
-        </p:spPr>
-      </p:pic>
-      <p:pic>
-        <p:nvPicPr>
-          <p:cNvPr id="7" name="Grafik 6"/>
-          <p:cNvPicPr>
-            <a:picLocks noChangeAspect="1"/>
-          </p:cNvPicPr>
-          <p:nvPr/>
-        </p:nvPicPr>
-        <p:blipFill>
-          <a:blip r:embed="rId6">
-            <a:extLst>
-              <a:ext uri="{28A0092B-C50C-407E-A947-70E740481C1C}">
-                <a14:useLocalDpi xmlns:a14="http://schemas.microsoft.com/office/drawing/2010/main" val="0"/>
-              </a:ext>
-            </a:extLst>
-          </a:blip>
-          <a:stretch>
-            <a:fillRect/>
-          </a:stretch>
-        </p:blipFill>
-        <p:spPr>
-          <a:xfrm>
-            <a:off x="2900180" y="4477599"/>
-            <a:ext cx="724001" cy="724001"/>
-          </a:xfrm>
-          <a:prstGeom prst="rect">
-            <a:avLst/>
-          </a:prstGeom>
-        </p:spPr>
-      </p:pic>
-      <p:sp>
-        <p:nvSpPr>
-          <p:cNvPr id="8" name="Textfeld 7"/>
-          <p:cNvSpPr txBox="1"/>
-          <p:nvPr/>
-        </p:nvSpPr>
-        <p:spPr>
-          <a:xfrm>
-            <a:off x="2270862" y="4654932"/>
-            <a:ext cx="714939" cy="369332"/>
-          </a:xfrm>
-          <a:prstGeom prst="rect">
-            <a:avLst/>
-          </a:prstGeom>
-          <a:noFill/>
-        </p:spPr>
-        <p:txBody>
-          <a:bodyPr wrap="none" rtlCol="0">
-            <a:spAutoFit/>
-          </a:bodyPr>
-          <a:lstStyle/>
-          <a:p>
-            <a:r>
-              <a:rPr lang="de-DE" dirty="0" smtClean="0"/>
-              <a:t>oder</a:t>
-            </a:r>
-            <a:endParaRPr lang="de-DE" dirty="0"/>
-          </a:p>
-        </p:txBody>
-      </p:sp>
-      <p:sp>
-        <p:nvSpPr>
-          <p:cNvPr id="9" name="Textfeld 8"/>
-          <p:cNvSpPr txBox="1"/>
-          <p:nvPr/>
-        </p:nvSpPr>
-        <p:spPr>
-          <a:xfrm>
-            <a:off x="3698789" y="2166052"/>
-            <a:ext cx="3165995" cy="369332"/>
-          </a:xfrm>
-          <a:prstGeom prst="rect">
-            <a:avLst/>
-          </a:prstGeom>
-          <a:noFill/>
-        </p:spPr>
-        <p:txBody>
-          <a:bodyPr wrap="none" rtlCol="0">
-            <a:spAutoFit/>
-          </a:bodyPr>
-          <a:lstStyle/>
-          <a:p>
-            <a:r>
-              <a:rPr lang="de-DE" dirty="0" smtClean="0"/>
-              <a:t>Melde dich im Browser an</a:t>
-            </a:r>
-            <a:endParaRPr lang="de-DE" dirty="0"/>
-          </a:p>
-        </p:txBody>
-      </p:sp>
-      <p:sp>
-        <p:nvSpPr>
-          <p:cNvPr id="10" name="Textfeld 9"/>
-          <p:cNvSpPr txBox="1"/>
-          <p:nvPr/>
-        </p:nvSpPr>
-        <p:spPr>
-          <a:xfrm>
-            <a:off x="3698789" y="2995679"/>
-            <a:ext cx="4714560" cy="369332"/>
-          </a:xfrm>
-          <a:prstGeom prst="rect">
-            <a:avLst/>
-          </a:prstGeom>
-          <a:noFill/>
-        </p:spPr>
-        <p:txBody>
-          <a:bodyPr wrap="none" rtlCol="0">
-            <a:spAutoFit/>
-          </a:bodyPr>
-          <a:lstStyle/>
-          <a:p>
-            <a:r>
-              <a:rPr lang="de-DE" dirty="0" smtClean="0"/>
-              <a:t>Erstelle eine </a:t>
-            </a:r>
-            <a:r>
-              <a:rPr lang="de-DE" dirty="0" err="1" smtClean="0"/>
-              <a:t>Blacklist</a:t>
-            </a:r>
-            <a:r>
-              <a:rPr lang="de-DE" dirty="0" smtClean="0"/>
-              <a:t> mit Inhaltsstoffen</a:t>
-            </a:r>
-            <a:endParaRPr lang="de-DE" dirty="0"/>
-          </a:p>
-        </p:txBody>
-      </p:sp>
-      <p:sp>
-        <p:nvSpPr>
-          <p:cNvPr id="11" name="Textfeld 10"/>
-          <p:cNvSpPr txBox="1"/>
-          <p:nvPr/>
-        </p:nvSpPr>
-        <p:spPr>
-          <a:xfrm>
-            <a:off x="3698789" y="3825306"/>
-            <a:ext cx="5322996" cy="369332"/>
-          </a:xfrm>
-          <a:prstGeom prst="rect">
-            <a:avLst/>
-          </a:prstGeom>
-          <a:noFill/>
-        </p:spPr>
-        <p:txBody>
-          <a:bodyPr wrap="none" rtlCol="0">
-            <a:spAutoFit/>
-          </a:bodyPr>
-          <a:lstStyle/>
-          <a:p>
-            <a:r>
-              <a:rPr lang="de-DE" dirty="0" smtClean="0"/>
-              <a:t>Scanne mit deinem HMD ein Produktbarcode</a:t>
-            </a:r>
-            <a:endParaRPr lang="de-DE" dirty="0"/>
-          </a:p>
-        </p:txBody>
-      </p:sp>
-      <p:sp>
-        <p:nvSpPr>
-          <p:cNvPr id="12" name="Textfeld 11"/>
-          <p:cNvSpPr txBox="1"/>
-          <p:nvPr/>
-        </p:nvSpPr>
-        <p:spPr>
-          <a:xfrm>
-            <a:off x="3698789" y="4516432"/>
-            <a:ext cx="6655796" cy="646331"/>
-          </a:xfrm>
-          <a:prstGeom prst="rect">
-            <a:avLst/>
-          </a:prstGeom>
-          <a:noFill/>
-        </p:spPr>
-        <p:txBody>
-          <a:bodyPr wrap="none" rtlCol="0">
-            <a:spAutoFit/>
-          </a:bodyPr>
-          <a:lstStyle/>
-          <a:p>
-            <a:r>
-              <a:rPr lang="de-DE" dirty="0" smtClean="0"/>
-              <a:t>Wir finden für dich heraus und sagen dir, ob das Produkt</a:t>
-            </a:r>
-          </a:p>
-          <a:p>
-            <a:r>
-              <a:rPr lang="de-DE" dirty="0"/>
-              <a:t>u</a:t>
-            </a:r>
-            <a:r>
-              <a:rPr lang="de-DE" dirty="0" smtClean="0"/>
-              <a:t>nerwünschte Inhalte enthält</a:t>
-            </a:r>
-            <a:endParaRPr lang="de-DE" dirty="0"/>
-          </a:p>
-        </p:txBody>
-      </p:sp>
     </p:spTree>
     <p:extLst>
       <p:ext uri="{BB962C8B-B14F-4D97-AF65-F5344CB8AC3E}">
-        <p14:creationId xmlns:p14="http://schemas.microsoft.com/office/powerpoint/2010/main" val="3986308133"/>
+        <p14:creationId xmlns:p14="http://schemas.microsoft.com/office/powerpoint/2010/main" val="2808028573"/>
       </p:ext>
     </p:extLst>
   </p:cSld>
@@ -3905,57 +3941,21 @@
           <a:p>
             <a:r>
               <a:rPr lang="de-DE" dirty="0" smtClean="0"/>
-              <a:t>Vorgehensmodell</a:t>
-            </a:r>
-            <a:endParaRPr lang="de-DE" dirty="0"/>
-          </a:p>
-        </p:txBody>
-      </p:sp>
-      <p:sp>
-        <p:nvSpPr>
-          <p:cNvPr id="3" name="Inhaltsplatzhalter 2"/>
-          <p:cNvSpPr>
-            <a:spLocks noGrp="1"/>
-          </p:cNvSpPr>
-          <p:nvPr>
-            <p:ph idx="1"/>
-          </p:nvPr>
-        </p:nvSpPr>
-        <p:spPr>
-          <a:xfrm>
-            <a:off x="838200" y="2163379"/>
-            <a:ext cx="10515600" cy="645726"/>
-          </a:xfrm>
-        </p:spPr>
-        <p:txBody>
-          <a:bodyPr/>
-          <a:lstStyle/>
-          <a:p>
-            <a:pPr marL="0" indent="0" algn="ctr">
-              <a:buNone/>
-            </a:pPr>
-            <a:r>
-              <a:rPr lang="de-DE" b="1" dirty="0" smtClean="0"/>
-              <a:t>Agile Entwicklung mit </a:t>
-            </a:r>
-            <a:r>
-              <a:rPr lang="de-DE" b="1" dirty="0" err="1" smtClean="0"/>
-              <a:t>Scrum</a:t>
-            </a:r>
-            <a:endParaRPr lang="de-DE" b="1" dirty="0" smtClean="0"/>
-          </a:p>
-          <a:p>
+              <a:t>Backend-Sequenzdiagramm</a:t>
+            </a:r>
             <a:endParaRPr lang="de-DE" dirty="0"/>
           </a:p>
         </p:txBody>
       </p:sp>
       <p:pic>
         <p:nvPicPr>
-          <p:cNvPr id="5" name="Grafik 4"/>
+          <p:cNvPr id="7" name="Inhaltsplatzhalter 6"/>
           <p:cNvPicPr>
-            <a:picLocks noChangeAspect="1"/>
+            <a:picLocks noGrp="1" noChangeAspect="1"/>
           </p:cNvPicPr>
-          <p:nvPr/>
+          <p:nvPr>
+            <p:ph idx="1"/>
+          </p:nvPr>
         </p:nvPicPr>
         <p:blipFill>
           <a:blip r:embed="rId2">
@@ -3971,168 +3971,15 @@
         </p:blipFill>
         <p:spPr>
           <a:xfrm>
-            <a:off x="6752312" y="3884597"/>
-            <a:ext cx="724001" cy="724001"/>
-          </a:xfrm>
-          <a:prstGeom prst="rect">
-            <a:avLst/>
-          </a:prstGeom>
+            <a:off x="3140571" y="1825625"/>
+            <a:ext cx="5910857" cy="4351338"/>
+          </a:xfrm>
         </p:spPr>
       </p:pic>
-      <p:sp>
-        <p:nvSpPr>
-          <p:cNvPr id="6" name="Textfeld 5"/>
-          <p:cNvSpPr txBox="1"/>
-          <p:nvPr/>
-        </p:nvSpPr>
-        <p:spPr>
-          <a:xfrm>
-            <a:off x="6153666" y="3465497"/>
-            <a:ext cx="1801070" cy="369332"/>
-          </a:xfrm>
-          <a:prstGeom prst="rect">
-            <a:avLst/>
-          </a:prstGeom>
-          <a:noFill/>
-        </p:spPr>
-        <p:txBody>
-          <a:bodyPr wrap="none" rtlCol="0">
-            <a:spAutoFit/>
-          </a:bodyPr>
-          <a:lstStyle/>
-          <a:p>
-            <a:r>
-              <a:rPr lang="de-DE" dirty="0" smtClean="0"/>
-              <a:t>Sprintwechsel</a:t>
-            </a:r>
-            <a:endParaRPr lang="de-DE" dirty="0"/>
-          </a:p>
-        </p:txBody>
-      </p:sp>
-      <p:sp>
-        <p:nvSpPr>
-          <p:cNvPr id="7" name="Textfeld 6"/>
-          <p:cNvSpPr txBox="1"/>
-          <p:nvPr/>
-        </p:nvSpPr>
-        <p:spPr>
-          <a:xfrm>
-            <a:off x="4316626" y="3465497"/>
-            <a:ext cx="741485" cy="369332"/>
-          </a:xfrm>
-          <a:prstGeom prst="rect">
-            <a:avLst/>
-          </a:prstGeom>
-          <a:noFill/>
-        </p:spPr>
-        <p:txBody>
-          <a:bodyPr wrap="none" rtlCol="0">
-            <a:spAutoFit/>
-          </a:bodyPr>
-          <a:lstStyle/>
-          <a:p>
-            <a:r>
-              <a:rPr lang="de-DE" dirty="0" smtClean="0"/>
-              <a:t>Daily</a:t>
-            </a:r>
-            <a:endParaRPr lang="de-DE" dirty="0"/>
-          </a:p>
-        </p:txBody>
-      </p:sp>
-      <p:pic>
-        <p:nvPicPr>
-          <p:cNvPr id="8" name="Grafik 7"/>
-          <p:cNvPicPr>
-            <a:picLocks noChangeAspect="1"/>
-          </p:cNvPicPr>
-          <p:nvPr/>
-        </p:nvPicPr>
-        <p:blipFill>
-          <a:blip r:embed="rId3">
-            <a:extLst>
-              <a:ext uri="{28A0092B-C50C-407E-A947-70E740481C1C}">
-                <a14:useLocalDpi xmlns:a14="http://schemas.microsoft.com/office/drawing/2010/main" val="0"/>
-              </a:ext>
-            </a:extLst>
-          </a:blip>
-          <a:stretch>
-            <a:fillRect/>
-          </a:stretch>
-        </p:blipFill>
-        <p:spPr>
-          <a:xfrm>
-            <a:off x="4325367" y="3880468"/>
-            <a:ext cx="724001" cy="724001"/>
-          </a:xfrm>
-          <a:prstGeom prst="rect">
-            <a:avLst/>
-          </a:prstGeom>
-        </p:spPr>
-      </p:pic>
-      <p:sp>
-        <p:nvSpPr>
-          <p:cNvPr id="9" name="Textfeld 8"/>
-          <p:cNvSpPr txBox="1"/>
-          <p:nvPr/>
-        </p:nvSpPr>
-        <p:spPr>
-          <a:xfrm>
-            <a:off x="4055527" y="4604469"/>
-            <a:ext cx="1263679" cy="369332"/>
-          </a:xfrm>
-          <a:prstGeom prst="rect">
-            <a:avLst/>
-          </a:prstGeom>
-          <a:noFill/>
-        </p:spPr>
-        <p:txBody>
-          <a:bodyPr wrap="none" rtlCol="0">
-            <a:spAutoFit/>
-          </a:bodyPr>
-          <a:lstStyle/>
-          <a:p>
-            <a:r>
-              <a:rPr lang="de-DE" dirty="0" smtClean="0"/>
-              <a:t>Mo, Mi, Fr</a:t>
-            </a:r>
-            <a:endParaRPr lang="de-DE" dirty="0"/>
-          </a:p>
-        </p:txBody>
-      </p:sp>
-      <p:sp>
-        <p:nvSpPr>
-          <p:cNvPr id="10" name="Textfeld 9"/>
-          <p:cNvSpPr txBox="1"/>
-          <p:nvPr/>
-        </p:nvSpPr>
-        <p:spPr>
-          <a:xfrm>
-            <a:off x="6089834" y="4629597"/>
-            <a:ext cx="1928733" cy="369332"/>
-          </a:xfrm>
-          <a:prstGeom prst="rect">
-            <a:avLst/>
-          </a:prstGeom>
-          <a:noFill/>
-        </p:spPr>
-        <p:txBody>
-          <a:bodyPr wrap="none" rtlCol="0">
-            <a:spAutoFit/>
-          </a:bodyPr>
-          <a:lstStyle/>
-          <a:p>
-            <a:r>
-              <a:rPr lang="de-DE" dirty="0" smtClean="0"/>
-              <a:t>Wöchentlich Di</a:t>
-            </a:r>
-            <a:endParaRPr lang="de-DE" dirty="0"/>
-          </a:p>
-        </p:txBody>
-      </p:sp>
     </p:spTree>
     <p:extLst>
       <p:ext uri="{BB962C8B-B14F-4D97-AF65-F5344CB8AC3E}">
-        <p14:creationId xmlns:p14="http://schemas.microsoft.com/office/powerpoint/2010/main" val="3631977178"/>
+        <p14:creationId xmlns:p14="http://schemas.microsoft.com/office/powerpoint/2010/main" val="2349288734"/>
       </p:ext>
     </p:extLst>
   </p:cSld>
@@ -4183,379 +4030,45 @@
           <a:p>
             <a:r>
               <a:rPr lang="de-DE" dirty="0" smtClean="0"/>
-              <a:t>Projektrollen</a:t>
+              <a:t>Backend-Übersicht</a:t>
             </a:r>
             <a:endParaRPr lang="de-DE" dirty="0"/>
           </a:p>
         </p:txBody>
       </p:sp>
-      <p:graphicFrame>
-        <p:nvGraphicFramePr>
-          <p:cNvPr id="4" name="Tabelle 3"/>
-          <p:cNvGraphicFramePr>
-            <a:graphicFrameLocks noGrp="1"/>
-          </p:cNvGraphicFramePr>
-          <p:nvPr>
-            <p:extLst>
-              <p:ext uri="{D42A27DB-BD31-4B8C-83A1-F6EECF244321}">
-                <p14:modId xmlns:p14="http://schemas.microsoft.com/office/powerpoint/2010/main" val="4242034844"/>
-              </p:ext>
-            </p:extLst>
-          </p:nvPr>
-        </p:nvGraphicFramePr>
-        <p:xfrm>
-          <a:off x="568410" y="1491048"/>
-          <a:ext cx="11203460" cy="4292303"/>
-        </p:xfrm>
-        <a:graphic>
-          <a:graphicData uri="http://schemas.openxmlformats.org/drawingml/2006/table">
-            <a:tbl>
-              <a:tblPr firstRow="1" bandRow="1">
-                <a:tableStyleId>{2D5ABB26-0587-4C30-8999-92F81FD0307C}</a:tableStyleId>
-              </a:tblPr>
-              <a:tblGrid>
-                <a:gridCol w="5601730"/>
-                <a:gridCol w="5601730"/>
-              </a:tblGrid>
-              <a:tr h="430093">
-                <a:tc>
-                  <a:txBody>
-                    <a:bodyPr/>
-                    <a:lstStyle/>
-                    <a:p>
-                      <a:pPr algn="r"/>
-                      <a:r>
-                        <a:rPr lang="de-DE" sz="2000" dirty="0" err="1" smtClean="0"/>
-                        <a:t>Scrum</a:t>
-                      </a:r>
-                      <a:r>
-                        <a:rPr lang="de-DE" sz="2000" dirty="0" smtClean="0"/>
-                        <a:t> Master</a:t>
-                      </a:r>
-                      <a:endParaRPr lang="de-DE" sz="2000" dirty="0"/>
-                    </a:p>
-                  </a:txBody>
-                  <a:tcPr/>
-                </a:tc>
-                <a:tc>
-                  <a:txBody>
-                    <a:bodyPr/>
-                    <a:lstStyle/>
-                    <a:p>
-                      <a:r>
-                        <a:rPr lang="de-DE" sz="2000" dirty="0" smtClean="0"/>
-                        <a:t>Marco Heumann</a:t>
-                      </a:r>
-                      <a:endParaRPr lang="de-DE" sz="2000" dirty="0"/>
-                    </a:p>
-                  </a:txBody>
-                  <a:tcPr/>
-                </a:tc>
-              </a:tr>
-              <a:tr h="430093">
-                <a:tc>
-                  <a:txBody>
-                    <a:bodyPr/>
-                    <a:lstStyle/>
-                    <a:p>
-                      <a:pPr algn="r"/>
-                      <a:r>
-                        <a:rPr lang="de-DE" sz="2000" dirty="0" smtClean="0"/>
-                        <a:t>Communication Manager</a:t>
-                      </a:r>
-                      <a:endParaRPr lang="de-DE" sz="2000" dirty="0"/>
-                    </a:p>
-                  </a:txBody>
-                  <a:tcPr/>
-                </a:tc>
-                <a:tc>
-                  <a:txBody>
-                    <a:bodyPr/>
-                    <a:lstStyle/>
-                    <a:p>
-                      <a:r>
-                        <a:rPr lang="de-DE" sz="2000" dirty="0" smtClean="0"/>
-                        <a:t>Edwin Neubauer</a:t>
-                      </a:r>
-                      <a:endParaRPr lang="de-DE" sz="2000" dirty="0"/>
-                    </a:p>
-                  </a:txBody>
-                  <a:tcPr/>
-                </a:tc>
-              </a:tr>
-              <a:tr h="430093">
-                <a:tc>
-                  <a:txBody>
-                    <a:bodyPr/>
-                    <a:lstStyle/>
-                    <a:p>
-                      <a:pPr algn="r"/>
-                      <a:r>
-                        <a:rPr lang="de-DE" sz="2000" dirty="0" smtClean="0"/>
-                        <a:t>Senior </a:t>
-                      </a:r>
-                      <a:r>
-                        <a:rPr lang="de-DE" sz="2000" dirty="0" err="1" smtClean="0"/>
-                        <a:t>Requirements</a:t>
-                      </a:r>
-                      <a:r>
-                        <a:rPr lang="de-DE" sz="2000" dirty="0" smtClean="0"/>
-                        <a:t> Analyst</a:t>
-                      </a:r>
-                      <a:endParaRPr lang="de-DE" sz="2000" dirty="0"/>
-                    </a:p>
-                  </a:txBody>
-                  <a:tcPr/>
-                </a:tc>
-                <a:tc>
-                  <a:txBody>
-                    <a:bodyPr/>
-                    <a:lstStyle/>
-                    <a:p>
-                      <a:r>
-                        <a:rPr lang="de-DE" sz="2000" dirty="0" smtClean="0"/>
-                        <a:t>Marco Schenkel</a:t>
-                      </a:r>
-                      <a:endParaRPr lang="de-DE" sz="2000" dirty="0"/>
-                    </a:p>
-                  </a:txBody>
-                  <a:tcPr/>
-                </a:tc>
-              </a:tr>
-              <a:tr h="430093">
-                <a:tc>
-                  <a:txBody>
-                    <a:bodyPr/>
-                    <a:lstStyle/>
-                    <a:p>
-                      <a:pPr algn="r"/>
-                      <a:r>
-                        <a:rPr lang="de-DE" sz="2000" dirty="0" err="1" smtClean="0"/>
-                        <a:t>Documentation</a:t>
-                      </a:r>
-                      <a:r>
-                        <a:rPr lang="de-DE" sz="2000" dirty="0" smtClean="0"/>
-                        <a:t> Manager</a:t>
-                      </a:r>
-                      <a:endParaRPr lang="de-DE" sz="2000" dirty="0"/>
-                    </a:p>
-                  </a:txBody>
-                  <a:tcPr/>
-                </a:tc>
-                <a:tc>
-                  <a:txBody>
-                    <a:bodyPr/>
-                    <a:lstStyle/>
-                    <a:p>
-                      <a:r>
-                        <a:rPr lang="de-DE" sz="2000" dirty="0" smtClean="0"/>
-                        <a:t>Edwin Neubauer</a:t>
-                      </a:r>
-                      <a:endParaRPr lang="de-DE" sz="2000" dirty="0"/>
-                    </a:p>
-                  </a:txBody>
-                  <a:tcPr/>
-                </a:tc>
-              </a:tr>
-              <a:tr h="421466">
-                <a:tc>
-                  <a:txBody>
-                    <a:bodyPr/>
-                    <a:lstStyle/>
-                    <a:p>
-                      <a:pPr algn="r"/>
-                      <a:r>
-                        <a:rPr lang="de-DE" sz="2000" dirty="0" smtClean="0"/>
-                        <a:t>Senior Mobile Frontend Developer</a:t>
-                      </a:r>
-                      <a:endParaRPr lang="de-DE" sz="2000" dirty="0"/>
-                    </a:p>
-                  </a:txBody>
-                  <a:tcPr/>
-                </a:tc>
-                <a:tc>
-                  <a:txBody>
-                    <a:bodyPr/>
-                    <a:lstStyle/>
-                    <a:p>
-                      <a:r>
-                        <a:rPr lang="de-DE" sz="2000" dirty="0" smtClean="0"/>
-                        <a:t>Gregor Baumgärtner</a:t>
-                      </a:r>
-                      <a:endParaRPr lang="de-DE" sz="2000" dirty="0"/>
-                    </a:p>
-                  </a:txBody>
-                  <a:tcPr/>
-                </a:tc>
-              </a:tr>
-              <a:tr h="430093">
-                <a:tc>
-                  <a:txBody>
-                    <a:bodyPr/>
-                    <a:lstStyle/>
-                    <a:p>
-                      <a:pPr algn="r"/>
-                      <a:r>
-                        <a:rPr lang="de-DE" sz="2000" dirty="0" smtClean="0"/>
-                        <a:t>Senior Web Frontend Developer</a:t>
-                      </a:r>
-                      <a:endParaRPr lang="de-DE" sz="2000" dirty="0"/>
-                    </a:p>
-                  </a:txBody>
-                  <a:tcPr/>
-                </a:tc>
-                <a:tc>
-                  <a:txBody>
-                    <a:bodyPr/>
-                    <a:lstStyle/>
-                    <a:p>
-                      <a:r>
-                        <a:rPr lang="de-DE" sz="2000" dirty="0" smtClean="0"/>
-                        <a:t>Hendrik Niemann</a:t>
-                      </a:r>
-                      <a:endParaRPr lang="de-DE" sz="2000" dirty="0"/>
-                    </a:p>
-                  </a:txBody>
-                  <a:tcPr/>
-                </a:tc>
-              </a:tr>
-              <a:tr h="430093">
-                <a:tc>
-                  <a:txBody>
-                    <a:bodyPr/>
-                    <a:lstStyle/>
-                    <a:p>
-                      <a:pPr algn="r"/>
-                      <a:r>
-                        <a:rPr lang="de-DE" sz="2000" dirty="0" smtClean="0"/>
-                        <a:t>Senior Backend Developer</a:t>
-                      </a:r>
-                      <a:endParaRPr lang="de-DE" sz="2000" dirty="0"/>
-                    </a:p>
-                  </a:txBody>
-                  <a:tcPr/>
-                </a:tc>
-                <a:tc>
-                  <a:txBody>
-                    <a:bodyPr/>
-                    <a:lstStyle/>
-                    <a:p>
-                      <a:r>
-                        <a:rPr lang="de-DE" sz="2000" dirty="0" smtClean="0"/>
-                        <a:t>Moritz </a:t>
-                      </a:r>
-                      <a:r>
-                        <a:rPr lang="de-DE" sz="2000" dirty="0" err="1" smtClean="0"/>
-                        <a:t>Bästlein</a:t>
-                      </a:r>
-                      <a:endParaRPr lang="de-DE" sz="2000" dirty="0"/>
-                    </a:p>
-                  </a:txBody>
-                  <a:tcPr/>
-                </a:tc>
-              </a:tr>
-              <a:tr h="430093">
-                <a:tc>
-                  <a:txBody>
-                    <a:bodyPr/>
-                    <a:lstStyle/>
-                    <a:p>
-                      <a:pPr algn="r"/>
-                      <a:r>
-                        <a:rPr lang="de-DE" sz="2000" dirty="0" smtClean="0"/>
-                        <a:t>Test Developer</a:t>
-                      </a:r>
-                      <a:endParaRPr lang="de-DE" sz="2000" dirty="0"/>
-                    </a:p>
-                  </a:txBody>
-                  <a:tcPr/>
-                </a:tc>
-                <a:tc>
-                  <a:txBody>
-                    <a:bodyPr/>
-                    <a:lstStyle/>
-                    <a:p>
-                      <a:r>
-                        <a:rPr lang="de-DE" sz="2000" dirty="0" smtClean="0"/>
-                        <a:t>Marco Heumann</a:t>
-                      </a:r>
-                    </a:p>
-                  </a:txBody>
-                  <a:tcPr/>
-                </a:tc>
-              </a:tr>
-              <a:tr h="430093">
-                <a:tc>
-                  <a:txBody>
-                    <a:bodyPr/>
-                    <a:lstStyle/>
-                    <a:p>
-                      <a:pPr algn="r"/>
-                      <a:r>
-                        <a:rPr lang="de-DE" sz="2000" dirty="0" smtClean="0"/>
-                        <a:t>Security</a:t>
-                      </a:r>
-                      <a:r>
-                        <a:rPr lang="de-DE" sz="2000" baseline="0" dirty="0" smtClean="0"/>
-                        <a:t> Administrator</a:t>
-                      </a:r>
-                      <a:endParaRPr lang="de-DE" sz="2000" dirty="0"/>
-                    </a:p>
-                  </a:txBody>
-                  <a:tcPr/>
-                </a:tc>
-                <a:tc>
-                  <a:txBody>
-                    <a:bodyPr/>
-                    <a:lstStyle/>
-                    <a:p>
-                      <a:r>
-                        <a:rPr lang="de-DE" sz="2000" dirty="0" smtClean="0"/>
-                        <a:t>Tim Bartel</a:t>
-                      </a:r>
-                    </a:p>
-                  </a:txBody>
-                  <a:tcPr/>
-                </a:tc>
-              </a:tr>
-              <a:tr h="430093">
-                <a:tc>
-                  <a:txBody>
-                    <a:bodyPr/>
-                    <a:lstStyle/>
-                    <a:p>
-                      <a:pPr algn="r"/>
-                      <a:r>
-                        <a:rPr lang="de-DE" sz="2000" dirty="0" smtClean="0"/>
-                        <a:t>Integration Manager</a:t>
-                      </a:r>
-                      <a:endParaRPr lang="de-DE" sz="2000" dirty="0"/>
-                    </a:p>
-                  </a:txBody>
-                  <a:tcPr/>
-                </a:tc>
-                <a:tc>
-                  <a:txBody>
-                    <a:bodyPr/>
-                    <a:lstStyle/>
-                    <a:p>
-                      <a:r>
-                        <a:rPr lang="de-DE" sz="2000" dirty="0" smtClean="0"/>
-                        <a:t>Hendrik Niemann</a:t>
-                      </a:r>
-                    </a:p>
-                  </a:txBody>
-                  <a:tcPr/>
-                </a:tc>
-              </a:tr>
-            </a:tbl>
-          </a:graphicData>
-        </a:graphic>
-      </p:graphicFrame>
+      <p:pic>
+        <p:nvPicPr>
+          <p:cNvPr id="8" name="Inhaltsplatzhalter 7"/>
+          <p:cNvPicPr>
+            <a:picLocks noGrp="1" noChangeAspect="1"/>
+          </p:cNvPicPr>
+          <p:nvPr>
+            <p:ph idx="1"/>
+          </p:nvPr>
+        </p:nvPicPr>
+        <p:blipFill>
+          <a:blip r:embed="rId2">
+            <a:extLst>
+              <a:ext uri="{28A0092B-C50C-407E-A947-70E740481C1C}">
+                <a14:useLocalDpi xmlns:a14="http://schemas.microsoft.com/office/drawing/2010/main" val="0"/>
+              </a:ext>
+            </a:extLst>
+          </a:blip>
+          <a:stretch>
+            <a:fillRect/>
+          </a:stretch>
+        </p:blipFill>
+        <p:spPr>
+          <a:xfrm>
+            <a:off x="2317810" y="1938297"/>
+            <a:ext cx="7556379" cy="4125993"/>
+          </a:xfrm>
+        </p:spPr>
+      </p:pic>
     </p:spTree>
     <p:extLst>
       <p:ext uri="{BB962C8B-B14F-4D97-AF65-F5344CB8AC3E}">
-        <p14:creationId xmlns:p14="http://schemas.microsoft.com/office/powerpoint/2010/main" val="1933050093"/>
+        <p14:creationId xmlns:p14="http://schemas.microsoft.com/office/powerpoint/2010/main" val="2219887838"/>
       </p:ext>
     </p:extLst>
   </p:cSld>
@@ -4605,127 +4118,46 @@
           <a:lstStyle/>
           <a:p>
             <a:r>
-              <a:rPr lang="de-DE" dirty="0" smtClean="0"/>
-              <a:t>Meilensteine</a:t>
+              <a:rPr lang="de-DE" dirty="0"/>
+              <a:t>Backend-Übersicht</a:t>
             </a:r>
             <a:endParaRPr lang="de-DE" dirty="0"/>
           </a:p>
         </p:txBody>
       </p:sp>
-      <p:sp>
-        <p:nvSpPr>
-          <p:cNvPr id="3" name="Inhaltsplatzhalter 2"/>
-          <p:cNvSpPr>
-            <a:spLocks noGrp="1"/>
-          </p:cNvSpPr>
+      <p:pic>
+        <p:nvPicPr>
+          <p:cNvPr id="6" name="Inhaltsplatzhalter 5"/>
+          <p:cNvPicPr>
+            <a:picLocks noGrp="1" noChangeAspect="1"/>
+          </p:cNvPicPr>
           <p:nvPr>
             <p:ph idx="1"/>
           </p:nvPr>
-        </p:nvSpPr>
-        <p:spPr/>
-        <p:txBody>
-          <a:bodyPr>
-            <a:normAutofit lnSpcReduction="10000"/>
-          </a:bodyPr>
-          <a:lstStyle/>
-          <a:p>
-            <a:r>
-              <a:rPr lang="de-DE" dirty="0" smtClean="0"/>
-              <a:t>Anforderungsanalyse (08.03.2015)</a:t>
-            </a:r>
-          </a:p>
-          <a:p>
-            <a:pPr lvl="1"/>
-            <a:r>
-              <a:rPr lang="de-DE" dirty="0" smtClean="0"/>
-              <a:t>Sammlung der funktionalen Anforderungen im </a:t>
-            </a:r>
-            <a:r>
-              <a:rPr lang="de-DE" dirty="0" err="1" smtClean="0"/>
-              <a:t>Product</a:t>
-            </a:r>
-            <a:r>
-              <a:rPr lang="de-DE" dirty="0" smtClean="0"/>
-              <a:t> </a:t>
-            </a:r>
-            <a:r>
-              <a:rPr lang="de-DE" dirty="0" err="1" smtClean="0"/>
-              <a:t>Backlog</a:t>
-            </a:r>
-            <a:endParaRPr lang="de-DE" dirty="0" smtClean="0"/>
-          </a:p>
-          <a:p>
-            <a:pPr lvl="1"/>
-            <a:r>
-              <a:rPr lang="de-DE" dirty="0" smtClean="0"/>
-              <a:t>Listung nichtfunktionaler und sonstiger Anforderungen</a:t>
-            </a:r>
-          </a:p>
-          <a:p>
-            <a:pPr lvl="1"/>
-            <a:r>
-              <a:rPr lang="de-DE" dirty="0" smtClean="0"/>
-              <a:t>Priorisierung der Anforderungen</a:t>
-            </a:r>
-          </a:p>
-          <a:p>
-            <a:pPr lvl="1"/>
-            <a:r>
-              <a:rPr lang="de-DE" dirty="0" smtClean="0"/>
-              <a:t>Aufwandsschätzungen</a:t>
-            </a:r>
-          </a:p>
-          <a:p>
-            <a:pPr lvl="1"/>
-            <a:r>
-              <a:rPr lang="de-DE" dirty="0" smtClean="0"/>
-              <a:t>Erstellung des Pflichtenhefts</a:t>
-            </a:r>
-          </a:p>
-          <a:p>
-            <a:pPr lvl="1"/>
-            <a:r>
-              <a:rPr lang="de-DE" dirty="0" err="1" smtClean="0"/>
-              <a:t>Usecase</a:t>
-            </a:r>
-            <a:r>
-              <a:rPr lang="de-DE" dirty="0" smtClean="0"/>
-              <a:t> und Aktivitätsdiagramme</a:t>
-            </a:r>
-          </a:p>
-          <a:p>
-            <a:r>
-              <a:rPr lang="de-DE" dirty="0" smtClean="0"/>
-              <a:t>Design (22.03.2015)</a:t>
-            </a:r>
-          </a:p>
-          <a:p>
-            <a:pPr lvl="1"/>
-            <a:r>
-              <a:rPr lang="de-DE" dirty="0" smtClean="0"/>
-              <a:t>Hardware Architektur</a:t>
-            </a:r>
-          </a:p>
-          <a:p>
-            <a:pPr lvl="1"/>
-            <a:r>
-              <a:rPr lang="de-DE" dirty="0" smtClean="0"/>
-              <a:t>Software Architektur</a:t>
-            </a:r>
-          </a:p>
-          <a:p>
-            <a:pPr lvl="1"/>
-            <a:r>
-              <a:rPr lang="de-DE" dirty="0" smtClean="0"/>
-              <a:t>Testkonzeption</a:t>
-            </a:r>
-          </a:p>
-        </p:txBody>
-      </p:sp>
+        </p:nvPicPr>
+        <p:blipFill>
+          <a:blip r:embed="rId2">
+            <a:extLst>
+              <a:ext uri="{28A0092B-C50C-407E-A947-70E740481C1C}">
+                <a14:useLocalDpi xmlns:a14="http://schemas.microsoft.com/office/drawing/2010/main" val="0"/>
+              </a:ext>
+            </a:extLst>
+          </a:blip>
+          <a:stretch>
+            <a:fillRect/>
+          </a:stretch>
+        </p:blipFill>
+        <p:spPr>
+          <a:xfrm>
+            <a:off x="2752258" y="1976949"/>
+            <a:ext cx="6687484" cy="4048690"/>
+          </a:xfrm>
+        </p:spPr>
+      </p:pic>
     </p:spTree>
     <p:extLst>
       <p:ext uri="{BB962C8B-B14F-4D97-AF65-F5344CB8AC3E}">
-        <p14:creationId xmlns:p14="http://schemas.microsoft.com/office/powerpoint/2010/main" val="2607245373"/>
+        <p14:creationId xmlns:p14="http://schemas.microsoft.com/office/powerpoint/2010/main" val="1177589568"/>
       </p:ext>
     </p:extLst>
   </p:cSld>
@@ -4776,93 +4208,223 @@
           <a:p>
             <a:r>
               <a:rPr lang="de-DE" dirty="0" smtClean="0"/>
-              <a:t>Meilensteine</a:t>
+              <a:t>Backend-Übersicht</a:t>
             </a:r>
             <a:endParaRPr lang="de-DE" dirty="0"/>
           </a:p>
         </p:txBody>
       </p:sp>
-      <p:sp>
-        <p:nvSpPr>
-          <p:cNvPr id="3" name="Inhaltsplatzhalter 2"/>
-          <p:cNvSpPr>
-            <a:spLocks noGrp="1"/>
-          </p:cNvSpPr>
+      <p:pic>
+        <p:nvPicPr>
+          <p:cNvPr id="4" name="Inhaltsplatzhalter 3"/>
+          <p:cNvPicPr>
+            <a:picLocks noGrp="1" noChangeAspect="1"/>
+          </p:cNvPicPr>
           <p:nvPr>
             <p:ph idx="1"/>
           </p:nvPr>
-        </p:nvSpPr>
-        <p:spPr/>
-        <p:txBody>
-          <a:bodyPr>
-            <a:normAutofit/>
-          </a:bodyPr>
-          <a:lstStyle/>
-          <a:p>
-            <a:r>
-              <a:rPr lang="de-DE" dirty="0" smtClean="0"/>
-              <a:t>Entwicklung (19.04.2015)</a:t>
-            </a:r>
-          </a:p>
-          <a:p>
-            <a:pPr lvl="1"/>
-            <a:r>
-              <a:rPr lang="de-DE" dirty="0" smtClean="0"/>
-              <a:t>Backend</a:t>
-            </a:r>
-            <a:endParaRPr lang="de-DE" dirty="0"/>
-          </a:p>
-          <a:p>
-            <a:pPr lvl="1"/>
-            <a:r>
-              <a:rPr lang="de-DE" dirty="0" smtClean="0"/>
-              <a:t>Frontend</a:t>
-            </a:r>
-          </a:p>
-          <a:p>
-            <a:pPr lvl="2"/>
-            <a:r>
-              <a:rPr lang="de-DE" dirty="0" smtClean="0"/>
-              <a:t>Applikation (</a:t>
-            </a:r>
-            <a:r>
-              <a:rPr lang="de-DE" dirty="0" err="1" smtClean="0"/>
-              <a:t>Vuzix</a:t>
-            </a:r>
-            <a:r>
-              <a:rPr lang="de-DE" dirty="0" smtClean="0"/>
-              <a:t>)</a:t>
-            </a:r>
-          </a:p>
-          <a:p>
-            <a:pPr lvl="2"/>
-            <a:r>
-              <a:rPr lang="de-DE" dirty="0" smtClean="0"/>
-              <a:t>Webinterface</a:t>
-            </a:r>
-          </a:p>
-          <a:p>
-            <a:pPr lvl="1"/>
-            <a:r>
-              <a:rPr lang="de-DE" dirty="0" smtClean="0"/>
-              <a:t>Agiles Testen innerhalb der Iterationen</a:t>
-            </a:r>
-          </a:p>
-          <a:p>
-            <a:endParaRPr lang="de-DE" dirty="0" smtClean="0"/>
-          </a:p>
-          <a:p>
-            <a:r>
-              <a:rPr lang="de-DE" dirty="0" smtClean="0"/>
-              <a:t>Abnahme durch den Kunden (am 27.04.2015)</a:t>
-            </a:r>
-          </a:p>
-        </p:txBody>
-      </p:sp>
+        </p:nvPicPr>
+        <p:blipFill>
+          <a:blip r:embed="rId2">
+            <a:extLst>
+              <a:ext uri="{28A0092B-C50C-407E-A947-70E740481C1C}">
+                <a14:useLocalDpi xmlns:a14="http://schemas.microsoft.com/office/drawing/2010/main" val="0"/>
+              </a:ext>
+            </a:extLst>
+          </a:blip>
+          <a:stretch>
+            <a:fillRect/>
+          </a:stretch>
+        </p:blipFill>
+        <p:spPr>
+          <a:xfrm>
+            <a:off x="2155820" y="1995470"/>
+            <a:ext cx="7880360" cy="4011647"/>
+          </a:xfrm>
+        </p:spPr>
+      </p:pic>
     </p:spTree>
     <p:extLst>
       <p:ext uri="{BB962C8B-B14F-4D97-AF65-F5344CB8AC3E}">
-        <p14:creationId xmlns:p14="http://schemas.microsoft.com/office/powerpoint/2010/main" val="2808028573"/>
+        <p14:creationId xmlns:p14="http://schemas.microsoft.com/office/powerpoint/2010/main" val="4151908499"/>
+      </p:ext>
+    </p:extLst>
+  </p:cSld>
+  <p:clrMapOvr>
+    <a:masterClrMapping/>
+  </p:clrMapOvr>
+  <p:timing>
+    <p:tnLst>
+      <p:par>
+        <p:cTn id="1" dur="indefinite" restart="never" nodeType="tmRoot"/>
+      </p:par>
+    </p:tnLst>
+  </p:timing>
+</p:sld>
+</file>
+
+<file path=ppt/slides/slide8.xml><?xml version="1.0" encoding="utf-8"?>
+<p:sld xmlns:a="http://schemas.openxmlformats.org/drawingml/2006/main" xmlns:r="http://schemas.openxmlformats.org/officeDocument/2006/relationships" xmlns:p="http://schemas.openxmlformats.org/presentationml/2006/main">
+  <p:cSld>
+    <p:spTree>
+      <p:nvGrpSpPr>
+        <p:cNvPr id="1" name=""/>
+        <p:cNvGrpSpPr/>
+        <p:nvPr/>
+      </p:nvGrpSpPr>
+      <p:grpSpPr>
+        <a:xfrm>
+          <a:off x="0" y="0"/>
+          <a:ext cx="0" cy="0"/>
+          <a:chOff x="0" y="0"/>
+          <a:chExt cx="0" cy="0"/>
+        </a:xfrm>
+      </p:grpSpPr>
+      <p:sp>
+        <p:nvSpPr>
+          <p:cNvPr id="2" name="Titel 1"/>
+          <p:cNvSpPr>
+            <a:spLocks noGrp="1"/>
+          </p:cNvSpPr>
+          <p:nvPr>
+            <p:ph type="title"/>
+          </p:nvPr>
+        </p:nvSpPr>
+        <p:spPr/>
+        <p:txBody>
+          <a:bodyPr/>
+          <a:lstStyle/>
+          <a:p>
+            <a:r>
+              <a:rPr lang="de-DE" dirty="0" smtClean="0"/>
+              <a:t>Backend-Übersicht</a:t>
+            </a:r>
+            <a:endParaRPr lang="de-DE" dirty="0"/>
+          </a:p>
+        </p:txBody>
+      </p:sp>
+      <p:pic>
+        <p:nvPicPr>
+          <p:cNvPr id="4" name="Inhaltsplatzhalter 3"/>
+          <p:cNvPicPr>
+            <a:picLocks noGrp="1" noChangeAspect="1"/>
+          </p:cNvPicPr>
+          <p:nvPr>
+            <p:ph idx="1"/>
+          </p:nvPr>
+        </p:nvPicPr>
+        <p:blipFill>
+          <a:blip r:embed="rId2">
+            <a:extLst>
+              <a:ext uri="{28A0092B-C50C-407E-A947-70E740481C1C}">
+                <a14:useLocalDpi xmlns:a14="http://schemas.microsoft.com/office/drawing/2010/main" val="0"/>
+              </a:ext>
+            </a:extLst>
+          </a:blip>
+          <a:stretch>
+            <a:fillRect/>
+          </a:stretch>
+        </p:blipFill>
+        <p:spPr>
+          <a:xfrm>
+            <a:off x="3260497" y="1825625"/>
+            <a:ext cx="5671006" cy="4351338"/>
+          </a:xfrm>
+        </p:spPr>
+      </p:pic>
+    </p:spTree>
+    <p:extLst>
+      <p:ext uri="{BB962C8B-B14F-4D97-AF65-F5344CB8AC3E}">
+        <p14:creationId xmlns:p14="http://schemas.microsoft.com/office/powerpoint/2010/main" val="992089430"/>
+      </p:ext>
+    </p:extLst>
+  </p:cSld>
+  <p:clrMapOvr>
+    <a:masterClrMapping/>
+  </p:clrMapOvr>
+  <p:timing>
+    <p:tnLst>
+      <p:par>
+        <p:cTn id="1" dur="indefinite" restart="never" nodeType="tmRoot"/>
+      </p:par>
+    </p:tnLst>
+  </p:timing>
+</p:sld>
+</file>
+
+<file path=ppt/slides/slide9.xml><?xml version="1.0" encoding="utf-8"?>
+<p:sld xmlns:a="http://schemas.openxmlformats.org/drawingml/2006/main" xmlns:r="http://schemas.openxmlformats.org/officeDocument/2006/relationships" xmlns:p="http://schemas.openxmlformats.org/presentationml/2006/main">
+  <p:cSld>
+    <p:spTree>
+      <p:nvGrpSpPr>
+        <p:cNvPr id="1" name=""/>
+        <p:cNvGrpSpPr/>
+        <p:nvPr/>
+      </p:nvGrpSpPr>
+      <p:grpSpPr>
+        <a:xfrm>
+          <a:off x="0" y="0"/>
+          <a:ext cx="0" cy="0"/>
+          <a:chOff x="0" y="0"/>
+          <a:chExt cx="0" cy="0"/>
+        </a:xfrm>
+      </p:grpSpPr>
+      <p:sp>
+        <p:nvSpPr>
+          <p:cNvPr id="2" name="Titel 1"/>
+          <p:cNvSpPr>
+            <a:spLocks noGrp="1"/>
+          </p:cNvSpPr>
+          <p:nvPr>
+            <p:ph type="title"/>
+          </p:nvPr>
+        </p:nvSpPr>
+        <p:spPr/>
+        <p:txBody>
+          <a:bodyPr/>
+          <a:lstStyle/>
+          <a:p>
+            <a:r>
+              <a:rPr lang="de-DE" dirty="0" smtClean="0"/>
+              <a:t>Web-Frontend-Klassendiagramm</a:t>
+            </a:r>
+            <a:endParaRPr lang="de-DE" dirty="0"/>
+          </a:p>
+        </p:txBody>
+      </p:sp>
+      <p:pic>
+        <p:nvPicPr>
+          <p:cNvPr id="4" name="Inhaltsplatzhalter 3"/>
+          <p:cNvPicPr>
+            <a:picLocks noGrp="1" noChangeAspect="1"/>
+          </p:cNvPicPr>
+          <p:nvPr>
+            <p:ph idx="1"/>
+          </p:nvPr>
+        </p:nvPicPr>
+        <p:blipFill>
+          <a:blip r:embed="rId2">
+            <a:extLst>
+              <a:ext uri="{28A0092B-C50C-407E-A947-70E740481C1C}">
+                <a14:useLocalDpi xmlns:a14="http://schemas.microsoft.com/office/drawing/2010/main" val="0"/>
+              </a:ext>
+            </a:extLst>
+          </a:blip>
+          <a:stretch>
+            <a:fillRect/>
+          </a:stretch>
+        </p:blipFill>
+        <p:spPr>
+          <a:xfrm>
+            <a:off x="2752246" y="1825625"/>
+            <a:ext cx="6687507" cy="4351338"/>
+          </a:xfrm>
+        </p:spPr>
+      </p:pic>
+    </p:spTree>
+    <p:extLst>
+      <p:ext uri="{BB962C8B-B14F-4D97-AF65-F5344CB8AC3E}">
+        <p14:creationId xmlns:p14="http://schemas.microsoft.com/office/powerpoint/2010/main" val="2220709006"/>
       </p:ext>
     </p:extLst>
   </p:cSld>
@@ -5074,7 +4636,7 @@
   <a:extraClrSchemeLst/>
   <a:extLst>
     <a:ext uri="{05A4C25C-085E-4340-85A3-A5531E510DB2}">
-      <thm15:themeFamily xmlns:thm15="http://schemas.microsoft.com/office/thememl/2012/main" name="Office Theme" id="{62F939B6-93AF-4DB8-9C6B-D6C7DFDC589F}" vid="{4A3C46E8-61CC-4603-A589-7422A47A8E4A}"/>
+      <thm15:themeFamily xmlns:thm15="http://schemas.microsoft.com/office/thememl/2012/main" xmlns="" name="Office Theme" id="{62F939B6-93AF-4DB8-9C6B-D6C7DFDC589F}" vid="{4A3C46E8-61CC-4603-A589-7422A47A8E4A}"/>
     </a:ext>
   </a:extLst>
 </a:theme>

</xml_diff>

<commit_message>
Added a Presentation konzept
</commit_message>
<xml_diff>
--- a/Allergeeks/Corporate Design/Bsp Präsi.pptx
+++ b/Allergeeks/Corporate Design/Bsp Präsi.pptx
@@ -8,15 +8,18 @@
     <p:sldId id="256" r:id="rId2"/>
     <p:sldId id="257" r:id="rId3"/>
     <p:sldId id="262" r:id="rId4"/>
-    <p:sldId id="263" r:id="rId5"/>
-    <p:sldId id="264" r:id="rId6"/>
-    <p:sldId id="265" r:id="rId7"/>
-    <p:sldId id="266" r:id="rId8"/>
-    <p:sldId id="267" r:id="rId9"/>
-    <p:sldId id="268" r:id="rId10"/>
-    <p:sldId id="269" r:id="rId11"/>
-    <p:sldId id="270" r:id="rId12"/>
-    <p:sldId id="271" r:id="rId13"/>
+    <p:sldId id="272" r:id="rId5"/>
+    <p:sldId id="273" r:id="rId6"/>
+    <p:sldId id="274" r:id="rId7"/>
+    <p:sldId id="275" r:id="rId8"/>
+    <p:sldId id="276" r:id="rId9"/>
+    <p:sldId id="277" r:id="rId10"/>
+    <p:sldId id="279" r:id="rId11"/>
+    <p:sldId id="280" r:id="rId12"/>
+    <p:sldId id="281" r:id="rId13"/>
+    <p:sldId id="282" r:id="rId14"/>
+    <p:sldId id="278" r:id="rId15"/>
+    <p:sldId id="271" r:id="rId16"/>
   </p:sldIdLst>
   <p:sldSz cx="12192000" cy="6858000"/>
   <p:notesSz cx="6858000" cy="9144000"/>
@@ -117,7 +120,7 @@
   </p:defaultTextStyle>
   <p:extLst>
     <p:ext uri="{EFAFB233-063F-42B5-8137-9DF3F51BA10A}">
-      <p15:sldGuideLst xmlns:p15="http://schemas.microsoft.com/office/powerpoint/2012/main" xmlns=""/>
+      <p15:sldGuideLst xmlns="" xmlns:p15="http://schemas.microsoft.com/office/powerpoint/2012/main"/>
     </p:ext>
   </p:extLst>
 </p:presentation>
@@ -267,7 +270,7 @@
             <a:fld id="{B61BEF0D-F0BB-DE4B-95CE-6DB70DBA9567}" type="datetimeFigureOut">
               <a:rPr lang="en-US" smtClean="0"/>
               <a:pPr/>
-              <a:t>4/12/2015</a:t>
+              <a:t>4/19/2015</a:t>
             </a:fld>
             <a:endParaRPr lang="en-US" dirty="0"/>
           </a:p>
@@ -499,7 +502,7 @@
           <a:p>
             <a:fld id="{55C6B4A9-1611-4792-9094-5F34BCA07E0B}" type="datetimeFigureOut">
               <a:rPr lang="en-US" smtClean="0"/>
-              <a:t>4/12/2015</a:t>
+              <a:t>4/19/2015</a:t>
             </a:fld>
             <a:endParaRPr lang="en-US" dirty="0"/>
           </a:p>
@@ -704,7 +707,7 @@
             <a:fld id="{B61BEF0D-F0BB-DE4B-95CE-6DB70DBA9567}" type="datetimeFigureOut">
               <a:rPr lang="en-US" smtClean="0"/>
               <a:pPr/>
-              <a:t>4/12/2015</a:t>
+              <a:t>4/19/2015</a:t>
             </a:fld>
             <a:endParaRPr lang="en-US" dirty="0"/>
           </a:p>
@@ -904,7 +907,7 @@
             <a:fld id="{B61BEF0D-F0BB-DE4B-95CE-6DB70DBA9567}" type="datetimeFigureOut">
               <a:rPr lang="en-US" smtClean="0"/>
               <a:pPr/>
-              <a:t>4/12/2015</a:t>
+              <a:t>4/19/2015</a:t>
             </a:fld>
             <a:endParaRPr lang="en-US" dirty="0"/>
           </a:p>
@@ -1176,7 +1179,7 @@
             <a:fld id="{B61BEF0D-F0BB-DE4B-95CE-6DB70DBA9567}" type="datetimeFigureOut">
               <a:rPr lang="en-US" smtClean="0"/>
               <a:pPr/>
-              <a:t>4/12/2015</a:t>
+              <a:t>4/19/2015</a:t>
             </a:fld>
             <a:endParaRPr lang="en-US" dirty="0"/>
           </a:p>
@@ -1433,7 +1436,7 @@
           <a:p>
             <a:fld id="{EB712588-04B1-427B-82EE-E8DB90309F08}" type="datetimeFigureOut">
               <a:rPr lang="en-US" smtClean="0"/>
-              <a:t>4/12/2015</a:t>
+              <a:t>4/19/2015</a:t>
             </a:fld>
             <a:endParaRPr lang="en-US" dirty="0"/>
           </a:p>
@@ -1825,7 +1828,7 @@
             <a:fld id="{B61BEF0D-F0BB-DE4B-95CE-6DB70DBA9567}" type="datetimeFigureOut">
               <a:rPr lang="en-US" smtClean="0"/>
               <a:pPr/>
-              <a:t>4/12/2015</a:t>
+              <a:t>4/19/2015</a:t>
             </a:fld>
             <a:endParaRPr lang="en-US" dirty="0"/>
           </a:p>
@@ -1969,7 +1972,7 @@
             <a:fld id="{B61BEF0D-F0BB-DE4B-95CE-6DB70DBA9567}" type="datetimeFigureOut">
               <a:rPr lang="en-US" smtClean="0"/>
               <a:pPr/>
-              <a:t>4/12/2015</a:t>
+              <a:t>4/19/2015</a:t>
             </a:fld>
             <a:endParaRPr lang="en-US" dirty="0"/>
           </a:p>
@@ -2090,7 +2093,7 @@
             <a:fld id="{B61BEF0D-F0BB-DE4B-95CE-6DB70DBA9567}" type="datetimeFigureOut">
               <a:rPr lang="en-US" smtClean="0"/>
               <a:pPr/>
-              <a:t>4/12/2015</a:t>
+              <a:t>4/19/2015</a:t>
             </a:fld>
             <a:endParaRPr lang="en-US" dirty="0"/>
           </a:p>
@@ -2392,7 +2395,7 @@
           <a:p>
             <a:fld id="{42A54C80-263E-416B-A8E0-580EDEADCBDC}" type="datetimeFigureOut">
               <a:rPr lang="en-US" smtClean="0"/>
-              <a:t>4/12/2015</a:t>
+              <a:t>4/19/2015</a:t>
             </a:fld>
             <a:endParaRPr lang="en-US" dirty="0"/>
           </a:p>
@@ -2670,7 +2673,7 @@
             <a:fld id="{B61BEF0D-F0BB-DE4B-95CE-6DB70DBA9567}" type="datetimeFigureOut">
               <a:rPr lang="en-US" smtClean="0"/>
               <a:pPr/>
-              <a:t>4/12/2015</a:t>
+              <a:t>4/19/2015</a:t>
             </a:fld>
             <a:endParaRPr lang="en-US" dirty="0"/>
           </a:p>
@@ -2891,7 +2894,7 @@
             <a:fld id="{B61BEF0D-F0BB-DE4B-95CE-6DB70DBA9567}" type="datetimeFigureOut">
               <a:rPr lang="en-US" smtClean="0"/>
               <a:pPr/>
-              <a:t>4/12/2015</a:t>
+              <a:t>4/19/2015</a:t>
             </a:fld>
             <a:endParaRPr lang="en-US" dirty="0"/>
           </a:p>
@@ -3356,10 +3359,7 @@
           <a:bodyPr/>
           <a:lstStyle/>
           <a:p>
-            <a:r>
-              <a:rPr lang="de-DE" b="1" dirty="0" smtClean="0"/>
-              <a:t>Software Architektur</a:t>
-            </a:r>
+            <a:endParaRPr lang="de-DE" b="1" dirty="0" smtClean="0"/>
           </a:p>
         </p:txBody>
       </p:sp>
@@ -3412,54 +3412,138 @@
         </p:nvSpPr>
         <p:spPr/>
         <p:txBody>
-          <a:bodyPr/>
-          <a:lstStyle/>
-          <a:p>
+          <a:bodyPr>
+            <a:normAutofit/>
+          </a:bodyPr>
+          <a:lstStyle/>
+          <a:p>
+            <a:r>
+              <a:rPr lang="de-DE" dirty="0" smtClean="0"/>
+              <a:t>Projektablauf</a:t>
+            </a:r>
+            <a:endParaRPr lang="de-DE" dirty="0"/>
+          </a:p>
+        </p:txBody>
+      </p:sp>
+      <p:sp>
+        <p:nvSpPr>
+          <p:cNvPr id="3" name="Inhaltsplatzhalter 2"/>
+          <p:cNvSpPr>
+            <a:spLocks noGrp="1"/>
+          </p:cNvSpPr>
+          <p:nvPr>
+            <p:ph idx="1"/>
+          </p:nvPr>
+        </p:nvSpPr>
+        <p:spPr/>
+        <p:txBody>
+          <a:bodyPr>
+            <a:normAutofit/>
+          </a:bodyPr>
+          <a:lstStyle/>
+          <a:p>
+            <a:r>
+              <a:rPr lang="de-DE" dirty="0" smtClean="0"/>
+              <a:t>Dritter </a:t>
+            </a:r>
+            <a:r>
+              <a:rPr lang="de-DE" dirty="0"/>
+              <a:t>Sprintwechsel 23+24.03</a:t>
+            </a:r>
+            <a:r>
+              <a:rPr lang="de-DE" dirty="0" smtClean="0"/>
+              <a:t>.</a:t>
+            </a:r>
+          </a:p>
+          <a:p>
+            <a:pPr lvl="1"/>
+            <a:r>
+              <a:rPr lang="de-DE" dirty="0"/>
+              <a:t>Abnahme der </a:t>
+            </a:r>
+            <a:r>
+              <a:rPr lang="de-DE" dirty="0" err="1" smtClean="0"/>
+              <a:t>Issues</a:t>
+            </a:r>
+            <a:endParaRPr lang="de-DE" dirty="0" smtClean="0"/>
+          </a:p>
+          <a:p>
+            <a:pPr lvl="1"/>
+            <a:r>
+              <a:rPr lang="de-DE" dirty="0" smtClean="0"/>
+              <a:t>Retrospektive</a:t>
+            </a:r>
+          </a:p>
+          <a:p>
+            <a:pPr lvl="2"/>
+            <a:r>
+              <a:rPr lang="de-DE" dirty="0" smtClean="0"/>
+              <a:t>Größe der Arbeitsgruppen klein(er) gestalten</a:t>
+            </a:r>
+          </a:p>
+          <a:p>
+            <a:pPr lvl="2"/>
+            <a:r>
+              <a:rPr lang="de-DE" dirty="0" smtClean="0"/>
+              <a:t>Stimmung des Teams: Zufrieden mit Fortschritt</a:t>
+            </a:r>
+            <a:endParaRPr lang="de-DE" dirty="0"/>
+          </a:p>
+          <a:p>
+            <a:pPr lvl="1"/>
+            <a:r>
+              <a:rPr lang="de-DE" dirty="0" smtClean="0"/>
+              <a:t>Verteilung von </a:t>
+            </a:r>
+            <a:r>
+              <a:rPr lang="de-DE" dirty="0" err="1" smtClean="0"/>
+              <a:t>Issues</a:t>
+            </a:r>
+            <a:endParaRPr lang="de-DE" dirty="0" smtClean="0"/>
+          </a:p>
+          <a:p>
+            <a:pPr lvl="2"/>
+            <a:r>
+              <a:rPr lang="de-DE" dirty="0" smtClean="0"/>
+              <a:t>Hardwarearchitektur realisieren</a:t>
+            </a:r>
+          </a:p>
+          <a:p>
+            <a:pPr lvl="2"/>
+            <a:r>
+              <a:rPr lang="de-DE" dirty="0" smtClean="0"/>
+              <a:t>Frontend: </a:t>
+            </a:r>
+            <a:r>
+              <a:rPr lang="de-DE" dirty="0" err="1" smtClean="0"/>
+              <a:t>Mockup</a:t>
+            </a:r>
+            <a:r>
+              <a:rPr lang="de-DE" dirty="0" smtClean="0"/>
+              <a:t> und Login</a:t>
+            </a:r>
+          </a:p>
+          <a:p>
+            <a:pPr lvl="2"/>
             <a:r>
               <a:rPr lang="de-DE" dirty="0" err="1" smtClean="0"/>
               <a:t>Vuzix</a:t>
             </a:r>
             <a:r>
               <a:rPr lang="de-DE" dirty="0" smtClean="0"/>
-              <a:t>-Klassendiagramm</a:t>
+              <a:t>: Barcode-Scanner</a:t>
             </a:r>
             <a:endParaRPr lang="de-DE" dirty="0"/>
           </a:p>
-        </p:txBody>
-      </p:sp>
-      <p:pic>
-        <p:nvPicPr>
-          <p:cNvPr id="4" name="Inhaltsplatzhalter 3"/>
-          <p:cNvPicPr>
-            <a:picLocks noGrp="1" noChangeAspect="1"/>
-          </p:cNvPicPr>
-          <p:nvPr>
-            <p:ph idx="1"/>
-          </p:nvPr>
-        </p:nvPicPr>
-        <p:blipFill>
-          <a:blip r:embed="rId2">
-            <a:extLst>
-              <a:ext uri="{28A0092B-C50C-407E-A947-70E740481C1C}">
-                <a14:useLocalDpi xmlns:a14="http://schemas.microsoft.com/office/drawing/2010/main" val="0"/>
-              </a:ext>
-            </a:extLst>
-          </a:blip>
-          <a:stretch>
-            <a:fillRect/>
-          </a:stretch>
-        </p:blipFill>
-        <p:spPr>
-          <a:xfrm>
-            <a:off x="2989856" y="1825625"/>
-            <a:ext cx="6212287" cy="4351338"/>
-          </a:xfrm>
-        </p:spPr>
-      </p:pic>
+          <a:p>
+            <a:endParaRPr lang="de-DE" dirty="0"/>
+          </a:p>
+        </p:txBody>
+      </p:sp>
     </p:spTree>
     <p:extLst>
       <p:ext uri="{BB962C8B-B14F-4D97-AF65-F5344CB8AC3E}">
-        <p14:creationId xmlns:p14="http://schemas.microsoft.com/office/powerpoint/2010/main" val="1943552789"/>
+        <p14:creationId xmlns:p14="http://schemas.microsoft.com/office/powerpoint/2010/main" val="3492031734"/>
       </p:ext>
     </p:extLst>
   </p:cSld>
@@ -3505,50 +3589,108 @@
         </p:nvSpPr>
         <p:spPr/>
         <p:txBody>
-          <a:bodyPr/>
-          <a:lstStyle/>
-          <a:p>
-            <a:r>
-              <a:rPr lang="de-DE" dirty="0" smtClean="0"/>
-              <a:t>Smartphone-Klassendiagramm</a:t>
+          <a:bodyPr>
+            <a:normAutofit/>
+          </a:bodyPr>
+          <a:lstStyle/>
+          <a:p>
+            <a:r>
+              <a:rPr lang="de-DE" dirty="0" smtClean="0"/>
+              <a:t>Projektablauf</a:t>
             </a:r>
             <a:endParaRPr lang="de-DE" dirty="0"/>
           </a:p>
         </p:txBody>
       </p:sp>
-      <p:pic>
-        <p:nvPicPr>
-          <p:cNvPr id="5" name="Inhaltsplatzhalter 4"/>
-          <p:cNvPicPr>
-            <a:picLocks noGrp="1" noChangeAspect="1"/>
-          </p:cNvPicPr>
+      <p:sp>
+        <p:nvSpPr>
+          <p:cNvPr id="3" name="Inhaltsplatzhalter 2"/>
+          <p:cNvSpPr>
+            <a:spLocks noGrp="1"/>
+          </p:cNvSpPr>
           <p:nvPr>
             <p:ph idx="1"/>
           </p:nvPr>
-        </p:nvPicPr>
-        <p:blipFill>
-          <a:blip r:embed="rId2">
-            <a:extLst>
-              <a:ext uri="{28A0092B-C50C-407E-A947-70E740481C1C}">
-                <a14:useLocalDpi xmlns:a14="http://schemas.microsoft.com/office/drawing/2010/main" val="0"/>
-              </a:ext>
-            </a:extLst>
-          </a:blip>
-          <a:stretch>
-            <a:fillRect/>
-          </a:stretch>
-        </p:blipFill>
-        <p:spPr>
-          <a:xfrm>
-            <a:off x="1465730" y="1825625"/>
-            <a:ext cx="9260539" cy="4351338"/>
-          </a:xfrm>
-        </p:spPr>
-      </p:pic>
+        </p:nvSpPr>
+        <p:spPr/>
+        <p:txBody>
+          <a:bodyPr>
+            <a:normAutofit/>
+          </a:bodyPr>
+          <a:lstStyle/>
+          <a:p>
+            <a:r>
+              <a:rPr lang="de-DE" dirty="0"/>
+              <a:t>Vierter Sprintwechsel 31.03.</a:t>
+            </a:r>
+          </a:p>
+          <a:p>
+            <a:pPr lvl="1"/>
+            <a:r>
+              <a:rPr lang="de-DE" dirty="0"/>
+              <a:t>Abnahme der </a:t>
+            </a:r>
+            <a:r>
+              <a:rPr lang="de-DE" dirty="0" err="1"/>
+              <a:t>Issues</a:t>
+            </a:r>
+            <a:endParaRPr lang="de-DE" dirty="0"/>
+          </a:p>
+          <a:p>
+            <a:pPr lvl="1"/>
+            <a:r>
+              <a:rPr lang="de-DE" dirty="0" smtClean="0"/>
+              <a:t>Retrospektive</a:t>
+            </a:r>
+          </a:p>
+          <a:p>
+            <a:pPr lvl="2"/>
+            <a:r>
+              <a:rPr lang="de-DE" dirty="0" smtClean="0"/>
+              <a:t>Kritik: Umsetzung von Programmier-</a:t>
+            </a:r>
+            <a:r>
+              <a:rPr lang="de-DE" dirty="0" err="1" smtClean="0"/>
+              <a:t>Issues</a:t>
+            </a:r>
+            <a:r>
+              <a:rPr lang="de-DE" dirty="0" smtClean="0"/>
+              <a:t> und Dokumentation von Quellcode</a:t>
+            </a:r>
+          </a:p>
+          <a:p>
+            <a:pPr lvl="2"/>
+            <a:r>
+              <a:rPr lang="de-DE" dirty="0" smtClean="0"/>
+              <a:t>Stimmung des Teams: Gemischt</a:t>
+            </a:r>
+            <a:endParaRPr lang="de-DE" dirty="0"/>
+          </a:p>
+          <a:p>
+            <a:pPr lvl="1"/>
+            <a:r>
+              <a:rPr lang="de-DE" dirty="0"/>
+              <a:t>Verteilung von </a:t>
+            </a:r>
+            <a:r>
+              <a:rPr lang="de-DE" dirty="0" err="1" smtClean="0"/>
+              <a:t>Issues</a:t>
+            </a:r>
+            <a:endParaRPr lang="de-DE" dirty="0" smtClean="0"/>
+          </a:p>
+          <a:p>
+            <a:pPr lvl="2"/>
+            <a:r>
+              <a:rPr lang="de-DE" dirty="0" smtClean="0"/>
+              <a:t>Hauptsächlich API / Backend</a:t>
+            </a:r>
+          </a:p>
+        </p:txBody>
+      </p:sp>
     </p:spTree>
     <p:extLst>
       <p:ext uri="{BB962C8B-B14F-4D97-AF65-F5344CB8AC3E}">
-        <p14:creationId xmlns:p14="http://schemas.microsoft.com/office/powerpoint/2010/main" val="4092993981"/>
+        <p14:creationId xmlns:p14="http://schemas.microsoft.com/office/powerpoint/2010/main" val="2560174521"/>
       </p:ext>
     </p:extLst>
   </p:cSld>
@@ -3566,6 +3708,419 @@
 </file>
 
 <file path=ppt/slides/slide12.xml><?xml version="1.0" encoding="utf-8"?>
+<p:sld xmlns:a="http://schemas.openxmlformats.org/drawingml/2006/main" xmlns:r="http://schemas.openxmlformats.org/officeDocument/2006/relationships" xmlns:p="http://schemas.openxmlformats.org/presentationml/2006/main">
+  <p:cSld>
+    <p:spTree>
+      <p:nvGrpSpPr>
+        <p:cNvPr id="1" name=""/>
+        <p:cNvGrpSpPr/>
+        <p:nvPr/>
+      </p:nvGrpSpPr>
+      <p:grpSpPr>
+        <a:xfrm>
+          <a:off x="0" y="0"/>
+          <a:ext cx="0" cy="0"/>
+          <a:chOff x="0" y="0"/>
+          <a:chExt cx="0" cy="0"/>
+        </a:xfrm>
+      </p:grpSpPr>
+      <p:sp>
+        <p:nvSpPr>
+          <p:cNvPr id="2" name="Titel 1"/>
+          <p:cNvSpPr>
+            <a:spLocks noGrp="1"/>
+          </p:cNvSpPr>
+          <p:nvPr>
+            <p:ph type="title"/>
+          </p:nvPr>
+        </p:nvSpPr>
+        <p:spPr/>
+        <p:txBody>
+          <a:bodyPr>
+            <a:normAutofit/>
+          </a:bodyPr>
+          <a:lstStyle/>
+          <a:p>
+            <a:r>
+              <a:rPr lang="de-DE" dirty="0" smtClean="0"/>
+              <a:t>Projektablauf</a:t>
+            </a:r>
+            <a:endParaRPr lang="de-DE" dirty="0"/>
+          </a:p>
+        </p:txBody>
+      </p:sp>
+      <p:sp>
+        <p:nvSpPr>
+          <p:cNvPr id="3" name="Inhaltsplatzhalter 2"/>
+          <p:cNvSpPr>
+            <a:spLocks noGrp="1"/>
+          </p:cNvSpPr>
+          <p:nvPr>
+            <p:ph idx="1"/>
+          </p:nvPr>
+        </p:nvSpPr>
+        <p:spPr/>
+        <p:txBody>
+          <a:bodyPr>
+            <a:normAutofit/>
+          </a:bodyPr>
+          <a:lstStyle/>
+          <a:p>
+            <a:r>
+              <a:rPr lang="de-DE" dirty="0"/>
+              <a:t>Fünfter Sprintwechsel 07.04.</a:t>
+            </a:r>
+          </a:p>
+          <a:p>
+            <a:pPr lvl="1"/>
+            <a:r>
+              <a:rPr lang="de-DE" dirty="0"/>
+              <a:t>Abnahme der </a:t>
+            </a:r>
+            <a:r>
+              <a:rPr lang="de-DE" dirty="0" err="1"/>
+              <a:t>Issues</a:t>
+            </a:r>
+            <a:endParaRPr lang="de-DE" dirty="0"/>
+          </a:p>
+          <a:p>
+            <a:pPr lvl="1"/>
+            <a:r>
+              <a:rPr lang="de-DE" dirty="0" smtClean="0"/>
+              <a:t>Retrospektive</a:t>
+            </a:r>
+          </a:p>
+          <a:p>
+            <a:pPr lvl="2"/>
+            <a:r>
+              <a:rPr lang="de-DE" dirty="0" smtClean="0"/>
+              <a:t>Allgemein ist das Team für mehr Qualität als Quantität</a:t>
+            </a:r>
+          </a:p>
+          <a:p>
+            <a:pPr lvl="2"/>
+            <a:r>
+              <a:rPr lang="de-DE" dirty="0" smtClean="0"/>
+              <a:t>Stimmung des Teams: Sehr gut</a:t>
+            </a:r>
+            <a:endParaRPr lang="de-DE" dirty="0"/>
+          </a:p>
+          <a:p>
+            <a:pPr lvl="1"/>
+            <a:r>
+              <a:rPr lang="de-DE" dirty="0"/>
+              <a:t>Verteilung von </a:t>
+            </a:r>
+            <a:r>
+              <a:rPr lang="de-DE" dirty="0" err="1" smtClean="0"/>
+              <a:t>Issues</a:t>
+            </a:r>
+            <a:endParaRPr lang="de-DE" dirty="0" smtClean="0"/>
+          </a:p>
+          <a:p>
+            <a:pPr lvl="2"/>
+            <a:r>
+              <a:rPr lang="de-DE" dirty="0" smtClean="0"/>
+              <a:t>Hauptsächlich Frontend</a:t>
+            </a:r>
+          </a:p>
+        </p:txBody>
+      </p:sp>
+    </p:spTree>
+    <p:extLst>
+      <p:ext uri="{BB962C8B-B14F-4D97-AF65-F5344CB8AC3E}">
+        <p14:creationId xmlns:p14="http://schemas.microsoft.com/office/powerpoint/2010/main" val="2570652742"/>
+      </p:ext>
+    </p:extLst>
+  </p:cSld>
+  <p:clrMapOvr>
+    <a:masterClrMapping/>
+  </p:clrMapOvr>
+  <p:timing>
+    <p:tnLst>
+      <p:par>
+        <p:cTn id="1" dur="indefinite" restart="never" nodeType="tmRoot"/>
+      </p:par>
+    </p:tnLst>
+  </p:timing>
+</p:sld>
+</file>
+
+<file path=ppt/slides/slide13.xml><?xml version="1.0" encoding="utf-8"?>
+<p:sld xmlns:a="http://schemas.openxmlformats.org/drawingml/2006/main" xmlns:r="http://schemas.openxmlformats.org/officeDocument/2006/relationships" xmlns:p="http://schemas.openxmlformats.org/presentationml/2006/main">
+  <p:cSld>
+    <p:spTree>
+      <p:nvGrpSpPr>
+        <p:cNvPr id="1" name=""/>
+        <p:cNvGrpSpPr/>
+        <p:nvPr/>
+      </p:nvGrpSpPr>
+      <p:grpSpPr>
+        <a:xfrm>
+          <a:off x="0" y="0"/>
+          <a:ext cx="0" cy="0"/>
+          <a:chOff x="0" y="0"/>
+          <a:chExt cx="0" cy="0"/>
+        </a:xfrm>
+      </p:grpSpPr>
+      <p:sp>
+        <p:nvSpPr>
+          <p:cNvPr id="2" name="Titel 1"/>
+          <p:cNvSpPr>
+            <a:spLocks noGrp="1"/>
+          </p:cNvSpPr>
+          <p:nvPr>
+            <p:ph type="title"/>
+          </p:nvPr>
+        </p:nvSpPr>
+        <p:spPr/>
+        <p:txBody>
+          <a:bodyPr>
+            <a:normAutofit/>
+          </a:bodyPr>
+          <a:lstStyle/>
+          <a:p>
+            <a:r>
+              <a:rPr lang="de-DE" dirty="0" smtClean="0"/>
+              <a:t>Projektablauf</a:t>
+            </a:r>
+            <a:endParaRPr lang="de-DE" dirty="0"/>
+          </a:p>
+        </p:txBody>
+      </p:sp>
+      <p:sp>
+        <p:nvSpPr>
+          <p:cNvPr id="3" name="Inhaltsplatzhalter 2"/>
+          <p:cNvSpPr>
+            <a:spLocks noGrp="1"/>
+          </p:cNvSpPr>
+          <p:nvPr>
+            <p:ph idx="1"/>
+          </p:nvPr>
+        </p:nvSpPr>
+        <p:spPr/>
+        <p:txBody>
+          <a:bodyPr>
+            <a:normAutofit/>
+          </a:bodyPr>
+          <a:lstStyle/>
+          <a:p>
+            <a:r>
+              <a:rPr lang="de-DE" dirty="0"/>
+              <a:t>Sechster Sprintwechsel 13.04.</a:t>
+            </a:r>
+          </a:p>
+          <a:p>
+            <a:pPr lvl="1"/>
+            <a:r>
+              <a:rPr lang="de-DE" dirty="0"/>
+              <a:t>Abnahme der </a:t>
+            </a:r>
+            <a:r>
+              <a:rPr lang="de-DE" dirty="0" err="1"/>
+              <a:t>Issues</a:t>
+            </a:r>
+            <a:endParaRPr lang="de-DE" dirty="0"/>
+          </a:p>
+          <a:p>
+            <a:pPr lvl="1"/>
+            <a:r>
+              <a:rPr lang="de-DE" dirty="0" smtClean="0"/>
+              <a:t>Retrospektive</a:t>
+            </a:r>
+          </a:p>
+          <a:p>
+            <a:pPr lvl="2"/>
+            <a:r>
+              <a:rPr lang="de-DE" dirty="0" smtClean="0"/>
+              <a:t>Team hat Sprint als unstrukturiert empfunden da sehr viel parallel am Frontend gemacht wurde</a:t>
+            </a:r>
+          </a:p>
+          <a:p>
+            <a:pPr lvl="2"/>
+            <a:r>
+              <a:rPr lang="de-DE" dirty="0" smtClean="0"/>
+              <a:t>Stimmung des Teams: Gemischt</a:t>
+            </a:r>
+            <a:endParaRPr lang="de-DE" dirty="0"/>
+          </a:p>
+          <a:p>
+            <a:pPr lvl="1"/>
+            <a:r>
+              <a:rPr lang="de-DE" dirty="0" smtClean="0"/>
+              <a:t>Planung zum Projektabschluss</a:t>
+            </a:r>
+          </a:p>
+          <a:p>
+            <a:pPr lvl="2"/>
+            <a:r>
+              <a:rPr lang="de-DE" dirty="0" smtClean="0"/>
+              <a:t>Hauptsächlich Bugfixing, Tests und Füllen des Frontend/der Datenbank mit Content</a:t>
+            </a:r>
+          </a:p>
+          <a:p>
+            <a:r>
+              <a:rPr lang="de-DE" dirty="0"/>
+              <a:t>Projekt Retrospektive</a:t>
+            </a:r>
+          </a:p>
+          <a:p>
+            <a:pPr lvl="1"/>
+            <a:r>
+              <a:rPr lang="de-DE" dirty="0"/>
+              <a:t>Abwägung ob </a:t>
+            </a:r>
+            <a:r>
+              <a:rPr lang="de-DE" dirty="0" err="1"/>
+              <a:t>Scrum</a:t>
+            </a:r>
+            <a:r>
+              <a:rPr lang="de-DE" dirty="0"/>
+              <a:t> für kleine/studentische Projekte geeignet</a:t>
+            </a:r>
+            <a:endParaRPr lang="de-DE" dirty="0"/>
+          </a:p>
+          <a:p>
+            <a:pPr lvl="2"/>
+            <a:endParaRPr lang="de-DE" dirty="0" smtClean="0"/>
+          </a:p>
+        </p:txBody>
+      </p:sp>
+    </p:spTree>
+    <p:extLst>
+      <p:ext uri="{BB962C8B-B14F-4D97-AF65-F5344CB8AC3E}">
+        <p14:creationId xmlns:p14="http://schemas.microsoft.com/office/powerpoint/2010/main" val="974827180"/>
+      </p:ext>
+    </p:extLst>
+  </p:cSld>
+  <p:clrMapOvr>
+    <a:masterClrMapping/>
+  </p:clrMapOvr>
+  <p:timing>
+    <p:tnLst>
+      <p:par>
+        <p:cTn id="1" dur="indefinite" restart="never" nodeType="tmRoot"/>
+      </p:par>
+    </p:tnLst>
+  </p:timing>
+</p:sld>
+</file>
+
+<file path=ppt/slides/slide14.xml><?xml version="1.0" encoding="utf-8"?>
+<p:sld xmlns:a="http://schemas.openxmlformats.org/drawingml/2006/main" xmlns:r="http://schemas.openxmlformats.org/officeDocument/2006/relationships" xmlns:p="http://schemas.openxmlformats.org/presentationml/2006/main">
+  <p:cSld>
+    <p:spTree>
+      <p:nvGrpSpPr>
+        <p:cNvPr id="1" name=""/>
+        <p:cNvGrpSpPr/>
+        <p:nvPr/>
+      </p:nvGrpSpPr>
+      <p:grpSpPr>
+        <a:xfrm>
+          <a:off x="0" y="0"/>
+          <a:ext cx="0" cy="0"/>
+          <a:chOff x="0" y="0"/>
+          <a:chExt cx="0" cy="0"/>
+        </a:xfrm>
+      </p:grpSpPr>
+      <p:sp>
+        <p:nvSpPr>
+          <p:cNvPr id="2" name="Titel 1"/>
+          <p:cNvSpPr>
+            <a:spLocks noGrp="1"/>
+          </p:cNvSpPr>
+          <p:nvPr>
+            <p:ph type="title"/>
+          </p:nvPr>
+        </p:nvSpPr>
+        <p:spPr/>
+        <p:txBody>
+          <a:bodyPr>
+            <a:normAutofit/>
+          </a:bodyPr>
+          <a:lstStyle/>
+          <a:p>
+            <a:r>
+              <a:rPr lang="de-DE" dirty="0" err="1" smtClean="0"/>
+              <a:t>Lession</a:t>
+            </a:r>
+            <a:r>
+              <a:rPr lang="de-DE" dirty="0" smtClean="0"/>
+              <a:t> </a:t>
+            </a:r>
+            <a:r>
+              <a:rPr lang="de-DE" dirty="0" err="1"/>
+              <a:t>learned</a:t>
+            </a:r>
+            <a:endParaRPr lang="de-DE" dirty="0"/>
+          </a:p>
+        </p:txBody>
+      </p:sp>
+      <p:sp>
+        <p:nvSpPr>
+          <p:cNvPr id="3" name="Inhaltsplatzhalter 2"/>
+          <p:cNvSpPr>
+            <a:spLocks noGrp="1"/>
+          </p:cNvSpPr>
+          <p:nvPr>
+            <p:ph idx="1"/>
+          </p:nvPr>
+        </p:nvSpPr>
+        <p:spPr/>
+        <p:txBody>
+          <a:bodyPr/>
+          <a:lstStyle/>
+          <a:p>
+            <a:r>
+              <a:rPr lang="de-DE" dirty="0" smtClean="0"/>
+              <a:t>Ablauf eines </a:t>
+            </a:r>
+            <a:r>
+              <a:rPr lang="de-DE" dirty="0" err="1" smtClean="0"/>
+              <a:t>Scrum</a:t>
+            </a:r>
+            <a:r>
+              <a:rPr lang="de-DE" dirty="0" smtClean="0"/>
+              <a:t> Projekts</a:t>
+            </a:r>
+          </a:p>
+          <a:p>
+            <a:r>
+              <a:rPr lang="de-DE" dirty="0" smtClean="0"/>
+              <a:t>Alle Aspekte eines Projektes wurden von </a:t>
+            </a:r>
+            <a:r>
+              <a:rPr lang="de-DE" smtClean="0"/>
+              <a:t>jedem gesehen</a:t>
+            </a:r>
+            <a:endParaRPr lang="de-DE" dirty="0"/>
+          </a:p>
+          <a:p>
+            <a:endParaRPr lang="de-DE" smtClean="0"/>
+          </a:p>
+        </p:txBody>
+      </p:sp>
+    </p:spTree>
+    <p:extLst>
+      <p:ext uri="{BB962C8B-B14F-4D97-AF65-F5344CB8AC3E}">
+        <p14:creationId xmlns:p14="http://schemas.microsoft.com/office/powerpoint/2010/main" val="2923049697"/>
+      </p:ext>
+    </p:extLst>
+  </p:cSld>
+  <p:clrMapOvr>
+    <a:masterClrMapping/>
+  </p:clrMapOvr>
+  <p:timing>
+    <p:tnLst>
+      <p:par>
+        <p:cTn id="1" dur="indefinite" restart="never" nodeType="tmRoot"/>
+      </p:par>
+    </p:tnLst>
+  </p:timing>
+</p:sld>
+</file>
+
+<file path=ppt/slides/slide15.xml><?xml version="1.0" encoding="utf-8"?>
 <p:sld xmlns:a="http://schemas.openxmlformats.org/drawingml/2006/main" xmlns:r="http://schemas.openxmlformats.org/officeDocument/2006/relationships" xmlns:p="http://schemas.openxmlformats.org/presentationml/2006/main">
   <p:cSld>
     <p:spTree>
@@ -3715,78 +4270,76 @@
         <p:spPr/>
         <p:txBody>
           <a:bodyPr>
-            <a:normAutofit lnSpcReduction="10000"/>
+            <a:normAutofit/>
           </a:bodyPr>
           <a:lstStyle/>
           <a:p>
-            <a:r>
-              <a:rPr lang="de-DE" dirty="0" smtClean="0"/>
-              <a:t>Backend</a:t>
-            </a:r>
-          </a:p>
-          <a:p>
             <a:pPr lvl="1"/>
             <a:r>
               <a:rPr lang="de-DE" dirty="0" smtClean="0"/>
-              <a:t>Klassendiagramm</a:t>
+              <a:t>Ablauf</a:t>
             </a:r>
           </a:p>
           <a:p>
             <a:pPr lvl="1"/>
             <a:r>
               <a:rPr lang="de-DE" dirty="0" smtClean="0"/>
-              <a:t>Sequenzdiagramm</a:t>
+              <a:t>Server</a:t>
             </a:r>
           </a:p>
           <a:p>
             <a:pPr lvl="1"/>
             <a:r>
               <a:rPr lang="de-DE" dirty="0" smtClean="0"/>
-              <a:t>Übersicht</a:t>
-            </a:r>
-          </a:p>
-          <a:p>
-            <a:r>
-              <a:rPr lang="de-DE" dirty="0" smtClean="0"/>
-              <a:t>Web-Frontend</a:t>
+              <a:t>Datenbank</a:t>
             </a:r>
           </a:p>
           <a:p>
             <a:pPr lvl="1"/>
             <a:r>
               <a:rPr lang="de-DE" dirty="0" smtClean="0"/>
-              <a:t>Klassendiagramm</a:t>
-            </a:r>
-          </a:p>
-          <a:p>
+              <a:t>API / Backend</a:t>
+            </a:r>
+          </a:p>
+          <a:p>
+            <a:pPr lvl="1"/>
+            <a:r>
+              <a:rPr lang="de-DE" dirty="0" smtClean="0"/>
+              <a:t>Frontend</a:t>
+            </a:r>
+          </a:p>
+          <a:p>
+            <a:pPr lvl="1"/>
             <a:r>
               <a:rPr lang="de-DE" dirty="0" err="1" smtClean="0"/>
               <a:t>Vuzix</a:t>
             </a:r>
-            <a:endParaRPr lang="de-DE" dirty="0" smtClean="0"/>
+            <a:r>
+              <a:rPr lang="de-DE" dirty="0" smtClean="0"/>
+              <a:t>-App</a:t>
+            </a:r>
           </a:p>
           <a:p>
             <a:pPr lvl="1"/>
             <a:r>
               <a:rPr lang="de-DE" dirty="0" smtClean="0"/>
-              <a:t>Klassendiagramm</a:t>
-            </a:r>
-          </a:p>
-          <a:p>
-            <a:r>
-              <a:rPr lang="de-DE" dirty="0" smtClean="0"/>
-              <a:t>Smartphone</a:t>
+              <a:t>Projektablauf</a:t>
             </a:r>
           </a:p>
           <a:p>
             <a:pPr lvl="1"/>
             <a:r>
-              <a:rPr lang="de-DE" dirty="0" smtClean="0"/>
-              <a:t>Klassendiagramm</a:t>
-            </a:r>
-          </a:p>
-          <a:p>
-            <a:pPr lvl="1"/>
+              <a:rPr lang="de-DE" dirty="0" err="1" smtClean="0"/>
+              <a:t>Lession</a:t>
+            </a:r>
+            <a:r>
+              <a:rPr lang="de-DE" dirty="0" smtClean="0"/>
+              <a:t> </a:t>
+            </a:r>
+            <a:r>
+              <a:rPr lang="de-DE" dirty="0" err="1" smtClean="0"/>
+              <a:t>learned</a:t>
+            </a:r>
             <a:endParaRPr lang="de-DE" dirty="0" smtClean="0"/>
           </a:p>
           <a:p>
@@ -3852,41 +4405,41 @@
           <a:p>
             <a:r>
               <a:rPr lang="de-DE" dirty="0" smtClean="0"/>
-              <a:t>Backend-Klassendiagramm</a:t>
+              <a:t>Ablauf</a:t>
             </a:r>
             <a:endParaRPr lang="de-DE" dirty="0"/>
           </a:p>
         </p:txBody>
       </p:sp>
-      <p:pic>
-        <p:nvPicPr>
-          <p:cNvPr id="5" name="Inhaltsplatzhalter 4"/>
-          <p:cNvPicPr>
-            <a:picLocks noGrp="1" noChangeAspect="1"/>
-          </p:cNvPicPr>
+      <p:sp>
+        <p:nvSpPr>
+          <p:cNvPr id="3" name="Inhaltsplatzhalter 2"/>
+          <p:cNvSpPr>
+            <a:spLocks noGrp="1"/>
+          </p:cNvSpPr>
           <p:nvPr>
             <p:ph idx="1"/>
           </p:nvPr>
-        </p:nvPicPr>
-        <p:blipFill>
-          <a:blip r:embed="rId2">
-            <a:extLst>
-              <a:ext uri="{28A0092B-C50C-407E-A947-70E740481C1C}">
-                <a14:useLocalDpi xmlns:a14="http://schemas.microsoft.com/office/drawing/2010/main" val="0"/>
-              </a:ext>
-            </a:extLst>
-          </a:blip>
-          <a:stretch>
-            <a:fillRect/>
-          </a:stretch>
-        </p:blipFill>
-        <p:spPr>
-          <a:xfrm>
-            <a:off x="1321421" y="1825625"/>
-            <a:ext cx="9549158" cy="4351338"/>
-          </a:xfrm>
-        </p:spPr>
-      </p:pic>
+        </p:nvSpPr>
+        <p:spPr/>
+        <p:txBody>
+          <a:bodyPr/>
+          <a:lstStyle/>
+          <a:p>
+            <a:r>
+              <a:rPr lang="de-DE" dirty="0" smtClean="0"/>
+              <a:t>Sequenzdia?</a:t>
+            </a:r>
+          </a:p>
+          <a:p>
+            <a:r>
+              <a:rPr lang="de-DE" dirty="0" smtClean="0"/>
+              <a:t>Aktivitätsdia?</a:t>
+            </a:r>
+            <a:endParaRPr lang="de-DE" dirty="0"/>
+          </a:p>
+        </p:txBody>
+      </p:sp>
     </p:spTree>
     <p:extLst>
       <p:ext uri="{BB962C8B-B14F-4D97-AF65-F5344CB8AC3E}">
@@ -3941,45 +4494,35 @@
           <a:p>
             <a:r>
               <a:rPr lang="de-DE" dirty="0" smtClean="0"/>
-              <a:t>Backend-Sequenzdiagramm</a:t>
+              <a:t>Server</a:t>
             </a:r>
             <a:endParaRPr lang="de-DE" dirty="0"/>
           </a:p>
         </p:txBody>
       </p:sp>
-      <p:pic>
-        <p:nvPicPr>
-          <p:cNvPr id="7" name="Inhaltsplatzhalter 6"/>
-          <p:cNvPicPr>
-            <a:picLocks noGrp="1" noChangeAspect="1"/>
-          </p:cNvPicPr>
+      <p:sp>
+        <p:nvSpPr>
+          <p:cNvPr id="3" name="Inhaltsplatzhalter 2"/>
+          <p:cNvSpPr>
+            <a:spLocks noGrp="1"/>
+          </p:cNvSpPr>
           <p:nvPr>
             <p:ph idx="1"/>
           </p:nvPr>
-        </p:nvPicPr>
-        <p:blipFill>
-          <a:blip r:embed="rId2">
-            <a:extLst>
-              <a:ext uri="{28A0092B-C50C-407E-A947-70E740481C1C}">
-                <a14:useLocalDpi xmlns:a14="http://schemas.microsoft.com/office/drawing/2010/main" val="0"/>
-              </a:ext>
-            </a:extLst>
-          </a:blip>
-          <a:stretch>
-            <a:fillRect/>
-          </a:stretch>
-        </p:blipFill>
-        <p:spPr>
-          <a:xfrm>
-            <a:off x="3140571" y="1825625"/>
-            <a:ext cx="5910857" cy="4351338"/>
-          </a:xfrm>
-        </p:spPr>
-      </p:pic>
+        </p:nvSpPr>
+        <p:spPr/>
+        <p:txBody>
+          <a:bodyPr/>
+          <a:lstStyle/>
+          <a:p>
+            <a:endParaRPr lang="de-DE" dirty="0"/>
+          </a:p>
+        </p:txBody>
+      </p:sp>
     </p:spTree>
     <p:extLst>
       <p:ext uri="{BB962C8B-B14F-4D97-AF65-F5344CB8AC3E}">
-        <p14:creationId xmlns:p14="http://schemas.microsoft.com/office/powerpoint/2010/main" val="2349288734"/>
+        <p14:creationId xmlns:p14="http://schemas.microsoft.com/office/powerpoint/2010/main" val="2919619131"/>
       </p:ext>
     </p:extLst>
   </p:cSld>
@@ -4030,45 +4573,35 @@
           <a:p>
             <a:r>
               <a:rPr lang="de-DE" dirty="0" smtClean="0"/>
-              <a:t>Backend-Übersicht</a:t>
+              <a:t>Datenbank</a:t>
             </a:r>
             <a:endParaRPr lang="de-DE" dirty="0"/>
           </a:p>
         </p:txBody>
       </p:sp>
-      <p:pic>
-        <p:nvPicPr>
-          <p:cNvPr id="8" name="Inhaltsplatzhalter 7"/>
-          <p:cNvPicPr>
-            <a:picLocks noGrp="1" noChangeAspect="1"/>
-          </p:cNvPicPr>
+      <p:sp>
+        <p:nvSpPr>
+          <p:cNvPr id="3" name="Inhaltsplatzhalter 2"/>
+          <p:cNvSpPr>
+            <a:spLocks noGrp="1"/>
+          </p:cNvSpPr>
           <p:nvPr>
             <p:ph idx="1"/>
           </p:nvPr>
-        </p:nvPicPr>
-        <p:blipFill>
-          <a:blip r:embed="rId2">
-            <a:extLst>
-              <a:ext uri="{28A0092B-C50C-407E-A947-70E740481C1C}">
-                <a14:useLocalDpi xmlns:a14="http://schemas.microsoft.com/office/drawing/2010/main" val="0"/>
-              </a:ext>
-            </a:extLst>
-          </a:blip>
-          <a:stretch>
-            <a:fillRect/>
-          </a:stretch>
-        </p:blipFill>
-        <p:spPr>
-          <a:xfrm>
-            <a:off x="2317810" y="1938297"/>
-            <a:ext cx="7556379" cy="4125993"/>
-          </a:xfrm>
-        </p:spPr>
-      </p:pic>
+        </p:nvSpPr>
+        <p:spPr/>
+        <p:txBody>
+          <a:bodyPr/>
+          <a:lstStyle/>
+          <a:p>
+            <a:endParaRPr lang="de-DE" dirty="0"/>
+          </a:p>
+        </p:txBody>
+      </p:sp>
     </p:spTree>
     <p:extLst>
       <p:ext uri="{BB962C8B-B14F-4D97-AF65-F5344CB8AC3E}">
-        <p14:creationId xmlns:p14="http://schemas.microsoft.com/office/powerpoint/2010/main" val="2219887838"/>
+        <p14:creationId xmlns:p14="http://schemas.microsoft.com/office/powerpoint/2010/main" val="1588141210"/>
       </p:ext>
     </p:extLst>
   </p:cSld>
@@ -4118,46 +4651,36 @@
           <a:lstStyle/>
           <a:p>
             <a:r>
-              <a:rPr lang="de-DE" dirty="0"/>
-              <a:t>Backend-Übersicht</a:t>
+              <a:rPr lang="de-DE" dirty="0" smtClean="0"/>
+              <a:t>API / Backend</a:t>
             </a:r>
             <a:endParaRPr lang="de-DE" dirty="0"/>
           </a:p>
         </p:txBody>
       </p:sp>
-      <p:pic>
-        <p:nvPicPr>
-          <p:cNvPr id="6" name="Inhaltsplatzhalter 5"/>
-          <p:cNvPicPr>
-            <a:picLocks noGrp="1" noChangeAspect="1"/>
-          </p:cNvPicPr>
+      <p:sp>
+        <p:nvSpPr>
+          <p:cNvPr id="3" name="Inhaltsplatzhalter 2"/>
+          <p:cNvSpPr>
+            <a:spLocks noGrp="1"/>
+          </p:cNvSpPr>
           <p:nvPr>
             <p:ph idx="1"/>
           </p:nvPr>
-        </p:nvPicPr>
-        <p:blipFill>
-          <a:blip r:embed="rId2">
-            <a:extLst>
-              <a:ext uri="{28A0092B-C50C-407E-A947-70E740481C1C}">
-                <a14:useLocalDpi xmlns:a14="http://schemas.microsoft.com/office/drawing/2010/main" val="0"/>
-              </a:ext>
-            </a:extLst>
-          </a:blip>
-          <a:stretch>
-            <a:fillRect/>
-          </a:stretch>
-        </p:blipFill>
-        <p:spPr>
-          <a:xfrm>
-            <a:off x="2752258" y="1976949"/>
-            <a:ext cx="6687484" cy="4048690"/>
-          </a:xfrm>
-        </p:spPr>
-      </p:pic>
+        </p:nvSpPr>
+        <p:spPr/>
+        <p:txBody>
+          <a:bodyPr/>
+          <a:lstStyle/>
+          <a:p>
+            <a:endParaRPr lang="de-DE" dirty="0"/>
+          </a:p>
+        </p:txBody>
+      </p:sp>
     </p:spTree>
     <p:extLst>
       <p:ext uri="{BB962C8B-B14F-4D97-AF65-F5344CB8AC3E}">
-        <p14:creationId xmlns:p14="http://schemas.microsoft.com/office/powerpoint/2010/main" val="1177589568"/>
+        <p14:creationId xmlns:p14="http://schemas.microsoft.com/office/powerpoint/2010/main" val="2786761497"/>
       </p:ext>
     </p:extLst>
   </p:cSld>
@@ -4208,45 +4731,35 @@
           <a:p>
             <a:r>
               <a:rPr lang="de-DE" dirty="0" smtClean="0"/>
-              <a:t>Backend-Übersicht</a:t>
+              <a:t>Frontend</a:t>
             </a:r>
             <a:endParaRPr lang="de-DE" dirty="0"/>
           </a:p>
         </p:txBody>
       </p:sp>
-      <p:pic>
-        <p:nvPicPr>
-          <p:cNvPr id="4" name="Inhaltsplatzhalter 3"/>
-          <p:cNvPicPr>
-            <a:picLocks noGrp="1" noChangeAspect="1"/>
-          </p:cNvPicPr>
+      <p:sp>
+        <p:nvSpPr>
+          <p:cNvPr id="3" name="Inhaltsplatzhalter 2"/>
+          <p:cNvSpPr>
+            <a:spLocks noGrp="1"/>
+          </p:cNvSpPr>
           <p:nvPr>
             <p:ph idx="1"/>
           </p:nvPr>
-        </p:nvPicPr>
-        <p:blipFill>
-          <a:blip r:embed="rId2">
-            <a:extLst>
-              <a:ext uri="{28A0092B-C50C-407E-A947-70E740481C1C}">
-                <a14:useLocalDpi xmlns:a14="http://schemas.microsoft.com/office/drawing/2010/main" val="0"/>
-              </a:ext>
-            </a:extLst>
-          </a:blip>
-          <a:stretch>
-            <a:fillRect/>
-          </a:stretch>
-        </p:blipFill>
-        <p:spPr>
-          <a:xfrm>
-            <a:off x="2155820" y="1995470"/>
-            <a:ext cx="7880360" cy="4011647"/>
-          </a:xfrm>
-        </p:spPr>
-      </p:pic>
+        </p:nvSpPr>
+        <p:spPr/>
+        <p:txBody>
+          <a:bodyPr/>
+          <a:lstStyle/>
+          <a:p>
+            <a:endParaRPr lang="de-DE" dirty="0"/>
+          </a:p>
+        </p:txBody>
+      </p:sp>
     </p:spTree>
     <p:extLst>
       <p:ext uri="{BB962C8B-B14F-4D97-AF65-F5344CB8AC3E}">
-        <p14:creationId xmlns:p14="http://schemas.microsoft.com/office/powerpoint/2010/main" val="4151908499"/>
+        <p14:creationId xmlns:p14="http://schemas.microsoft.com/office/powerpoint/2010/main" val="3301113212"/>
       </p:ext>
     </p:extLst>
   </p:cSld>
@@ -4292,50 +4805,46 @@
         </p:nvSpPr>
         <p:spPr/>
         <p:txBody>
-          <a:bodyPr/>
-          <a:lstStyle/>
-          <a:p>
-            <a:r>
-              <a:rPr lang="de-DE" dirty="0" smtClean="0"/>
-              <a:t>Backend-Übersicht</a:t>
+          <a:bodyPr>
+            <a:normAutofit/>
+          </a:bodyPr>
+          <a:lstStyle/>
+          <a:p>
+            <a:r>
+              <a:rPr lang="de-DE" dirty="0" err="1" smtClean="0"/>
+              <a:t>Vuzix</a:t>
+            </a:r>
+            <a:r>
+              <a:rPr lang="de-DE" dirty="0" smtClean="0"/>
+              <a:t>-App</a:t>
             </a:r>
             <a:endParaRPr lang="de-DE" dirty="0"/>
           </a:p>
         </p:txBody>
       </p:sp>
-      <p:pic>
-        <p:nvPicPr>
-          <p:cNvPr id="4" name="Inhaltsplatzhalter 3"/>
-          <p:cNvPicPr>
-            <a:picLocks noGrp="1" noChangeAspect="1"/>
-          </p:cNvPicPr>
+      <p:sp>
+        <p:nvSpPr>
+          <p:cNvPr id="3" name="Inhaltsplatzhalter 2"/>
+          <p:cNvSpPr>
+            <a:spLocks noGrp="1"/>
+          </p:cNvSpPr>
           <p:nvPr>
             <p:ph idx="1"/>
           </p:nvPr>
-        </p:nvPicPr>
-        <p:blipFill>
-          <a:blip r:embed="rId2">
-            <a:extLst>
-              <a:ext uri="{28A0092B-C50C-407E-A947-70E740481C1C}">
-                <a14:useLocalDpi xmlns:a14="http://schemas.microsoft.com/office/drawing/2010/main" val="0"/>
-              </a:ext>
-            </a:extLst>
-          </a:blip>
-          <a:stretch>
-            <a:fillRect/>
-          </a:stretch>
-        </p:blipFill>
-        <p:spPr>
-          <a:xfrm>
-            <a:off x="3260497" y="1825625"/>
-            <a:ext cx="5671006" cy="4351338"/>
-          </a:xfrm>
-        </p:spPr>
-      </p:pic>
+        </p:nvSpPr>
+        <p:spPr/>
+        <p:txBody>
+          <a:bodyPr/>
+          <a:lstStyle/>
+          <a:p>
+            <a:endParaRPr lang="de-DE" dirty="0"/>
+          </a:p>
+        </p:txBody>
+      </p:sp>
     </p:spTree>
     <p:extLst>
       <p:ext uri="{BB962C8B-B14F-4D97-AF65-F5344CB8AC3E}">
-        <p14:creationId xmlns:p14="http://schemas.microsoft.com/office/powerpoint/2010/main" val="992089430"/>
+        <p14:creationId xmlns:p14="http://schemas.microsoft.com/office/powerpoint/2010/main" val="2561323560"/>
       </p:ext>
     </p:extLst>
   </p:cSld>
@@ -4381,50 +4890,143 @@
         </p:nvSpPr>
         <p:spPr/>
         <p:txBody>
-          <a:bodyPr/>
-          <a:lstStyle/>
-          <a:p>
-            <a:r>
-              <a:rPr lang="de-DE" dirty="0" smtClean="0"/>
-              <a:t>Web-Frontend-Klassendiagramm</a:t>
+          <a:bodyPr>
+            <a:normAutofit/>
+          </a:bodyPr>
+          <a:lstStyle/>
+          <a:p>
+            <a:r>
+              <a:rPr lang="de-DE" dirty="0" smtClean="0"/>
+              <a:t>Projektablauf</a:t>
             </a:r>
             <a:endParaRPr lang="de-DE" dirty="0"/>
           </a:p>
         </p:txBody>
       </p:sp>
-      <p:pic>
-        <p:nvPicPr>
-          <p:cNvPr id="4" name="Inhaltsplatzhalter 3"/>
-          <p:cNvPicPr>
-            <a:picLocks noGrp="1" noChangeAspect="1"/>
-          </p:cNvPicPr>
+      <p:sp>
+        <p:nvSpPr>
+          <p:cNvPr id="3" name="Inhaltsplatzhalter 2"/>
+          <p:cNvSpPr>
+            <a:spLocks noGrp="1"/>
+          </p:cNvSpPr>
           <p:nvPr>
             <p:ph idx="1"/>
           </p:nvPr>
-        </p:nvPicPr>
-        <p:blipFill>
-          <a:blip r:embed="rId2">
-            <a:extLst>
-              <a:ext uri="{28A0092B-C50C-407E-A947-70E740481C1C}">
-                <a14:useLocalDpi xmlns:a14="http://schemas.microsoft.com/office/drawing/2010/main" val="0"/>
-              </a:ext>
-            </a:extLst>
-          </a:blip>
-          <a:stretch>
-            <a:fillRect/>
-          </a:stretch>
-        </p:blipFill>
-        <p:spPr>
-          <a:xfrm>
-            <a:off x="2752246" y="1825625"/>
-            <a:ext cx="6687507" cy="4351338"/>
-          </a:xfrm>
-        </p:spPr>
-      </p:pic>
+        </p:nvSpPr>
+        <p:spPr/>
+        <p:txBody>
+          <a:bodyPr>
+            <a:normAutofit/>
+          </a:bodyPr>
+          <a:lstStyle/>
+          <a:p>
+            <a:r>
+              <a:rPr lang="de-DE" dirty="0" smtClean="0"/>
+              <a:t>Erster Sprintwechsel 10.03.</a:t>
+            </a:r>
+          </a:p>
+          <a:p>
+            <a:pPr lvl="1"/>
+            <a:r>
+              <a:rPr lang="de-DE" dirty="0" smtClean="0"/>
+              <a:t>Verteilung der ersten </a:t>
+            </a:r>
+            <a:r>
+              <a:rPr lang="de-DE" dirty="0" err="1" smtClean="0"/>
+              <a:t>Issues</a:t>
+            </a:r>
+            <a:r>
+              <a:rPr lang="de-DE" dirty="0" smtClean="0"/>
+              <a:t> </a:t>
+            </a:r>
+          </a:p>
+          <a:p>
+            <a:pPr lvl="2"/>
+            <a:r>
+              <a:rPr lang="de-DE" dirty="0" smtClean="0"/>
+              <a:t>Hauptsächlich Architekturen</a:t>
+            </a:r>
+          </a:p>
+          <a:p>
+            <a:pPr lvl="1"/>
+            <a:r>
+              <a:rPr lang="de-DE" dirty="0" smtClean="0"/>
+              <a:t>Vorbereiten des </a:t>
+            </a:r>
+            <a:r>
+              <a:rPr lang="de-DE" dirty="0" err="1" smtClean="0"/>
+              <a:t>Backlogs</a:t>
+            </a:r>
+            <a:r>
+              <a:rPr lang="de-DE" dirty="0" smtClean="0"/>
+              <a:t> für künftige Sprints</a:t>
+            </a:r>
+          </a:p>
+          <a:p>
+            <a:r>
+              <a:rPr lang="de-DE" dirty="0" smtClean="0"/>
+              <a:t>Zweiter Sprintwechsel 17.03.</a:t>
+            </a:r>
+          </a:p>
+          <a:p>
+            <a:pPr lvl="1"/>
+            <a:r>
+              <a:rPr lang="de-DE" dirty="0" smtClean="0"/>
+              <a:t>Abnahme der </a:t>
+            </a:r>
+            <a:r>
+              <a:rPr lang="de-DE" dirty="0" err="1" smtClean="0"/>
+              <a:t>Issues</a:t>
+            </a:r>
+            <a:endParaRPr lang="de-DE" dirty="0" smtClean="0"/>
+          </a:p>
+          <a:p>
+            <a:pPr lvl="1"/>
+            <a:r>
+              <a:rPr lang="de-DE" dirty="0" smtClean="0"/>
+              <a:t>Retrospektive</a:t>
+            </a:r>
+          </a:p>
+          <a:p>
+            <a:pPr lvl="2"/>
+            <a:r>
+              <a:rPr lang="de-DE" dirty="0" smtClean="0"/>
+              <a:t>Zusammenarbeit fördern (räumlich)</a:t>
+            </a:r>
+          </a:p>
+          <a:p>
+            <a:pPr lvl="2"/>
+            <a:r>
+              <a:rPr lang="de-DE" dirty="0" smtClean="0"/>
+              <a:t>Stimmung des Teams: Gut</a:t>
+            </a:r>
+          </a:p>
+          <a:p>
+            <a:pPr lvl="1"/>
+            <a:r>
+              <a:rPr lang="de-DE" dirty="0" smtClean="0"/>
+              <a:t>Verteilung von </a:t>
+            </a:r>
+            <a:r>
+              <a:rPr lang="de-DE" dirty="0" err="1" smtClean="0"/>
+              <a:t>Issues</a:t>
+            </a:r>
+            <a:endParaRPr lang="de-DE" dirty="0" smtClean="0"/>
+          </a:p>
+          <a:p>
+            <a:pPr lvl="2"/>
+            <a:r>
+              <a:rPr lang="de-DE" dirty="0" smtClean="0"/>
+              <a:t>Hauptsächlich Konzepte</a:t>
+            </a:r>
+            <a:endParaRPr lang="de-DE" dirty="0"/>
+          </a:p>
+        </p:txBody>
+      </p:sp>
     </p:spTree>
     <p:extLst>
       <p:ext uri="{BB962C8B-B14F-4D97-AF65-F5344CB8AC3E}">
-        <p14:creationId xmlns:p14="http://schemas.microsoft.com/office/powerpoint/2010/main" val="2220709006"/>
+        <p14:creationId xmlns:p14="http://schemas.microsoft.com/office/powerpoint/2010/main" val="173347956"/>
       </p:ext>
     </p:extLst>
   </p:cSld>
@@ -4636,7 +5238,7 @@
   <a:extraClrSchemeLst/>
   <a:extLst>
     <a:ext uri="{05A4C25C-085E-4340-85A3-A5531E510DB2}">
-      <thm15:themeFamily xmlns:thm15="http://schemas.microsoft.com/office/thememl/2012/main" xmlns="" name="Office Theme" id="{62F939B6-93AF-4DB8-9C6B-D6C7DFDC589F}" vid="{4A3C46E8-61CC-4603-A589-7422A47A8E4A}"/>
+      <thm15:themeFamily xmlns="" xmlns:thm15="http://schemas.microsoft.com/office/thememl/2012/main" name="Office Theme" id="{62F939B6-93AF-4DB8-9C6B-D6C7DFDC589F}" vid="{4A3C46E8-61CC-4603-A589-7422A47A8E4A}"/>
     </a:ext>
   </a:extLst>
 </a:theme>

</xml_diff>